<commit_message>
Ajout du cours SSH
</commit_message>
<xml_diff>
--- a/Module05_AccesDistant/CoursAccesDistant.pptx
+++ b/Module05_AccesDistant/CoursAccesDistant.pptx
@@ -5,10 +5,10 @@
     <p:sldMasterId id="2147483660" r:id="rId4"/>
   </p:sldMasterIdLst>
   <p:notesMasterIdLst>
-    <p:notesMasterId r:id="rId14"/>
+    <p:notesMasterId r:id="rId20"/>
   </p:notesMasterIdLst>
   <p:handoutMasterIdLst>
-    <p:handoutMasterId r:id="rId15"/>
+    <p:handoutMasterId r:id="rId21"/>
   </p:handoutMasterIdLst>
   <p:sldIdLst>
     <p:sldId id="256" r:id="rId5"/>
@@ -19,7 +19,13 @@
     <p:sldId id="261" r:id="rId10"/>
     <p:sldId id="262" r:id="rId11"/>
     <p:sldId id="263" r:id="rId12"/>
-    <p:sldId id="264" r:id="rId13"/>
+    <p:sldId id="268" r:id="rId13"/>
+    <p:sldId id="266" r:id="rId14"/>
+    <p:sldId id="264" r:id="rId15"/>
+    <p:sldId id="265" r:id="rId16"/>
+    <p:sldId id="267" r:id="rId17"/>
+    <p:sldId id="269" r:id="rId18"/>
+    <p:sldId id="270" r:id="rId19"/>
   </p:sldIdLst>
   <p:sldSz cx="12192000" cy="6858000"/>
   <p:notesSz cx="6858000" cy="9144000"/>
@@ -131,7 +137,13 @@
             <p14:sldId id="261"/>
             <p14:sldId id="262"/>
             <p14:sldId id="263"/>
+            <p14:sldId id="268"/>
+            <p14:sldId id="266"/>
             <p14:sldId id="264"/>
+            <p14:sldId id="265"/>
+            <p14:sldId id="267"/>
+            <p14:sldId id="269"/>
+            <p14:sldId id="270"/>
           </p14:sldIdLst>
         </p14:section>
       </p14:sectionLst>
@@ -166,7 +178,7 @@
 <file path=ppt/revisionInfo.xml><?xml version="1.0" encoding="utf-8"?>
 <p1510:revInfo xmlns:a="http://schemas.openxmlformats.org/drawingml/2006/main" xmlns:r="http://schemas.openxmlformats.org/officeDocument/2006/relationships" xmlns:p1510="http://schemas.microsoft.com/office/powerpoint/2015/10/main">
   <p1510:revLst>
-    <p1510:client id="{152DA1A4-96BD-4CAB-94D0-806651E00DB1}" v="230" dt="2021-05-27T15:57:35.635"/>
+    <p1510:client id="{E98B3899-DC4E-4893-976A-FAD88EAC8D31}" v="1038" dt="2021-06-01T15:01:50.722"/>
   </p1510:revLst>
 </p1510:revInfo>
 </file>
@@ -646,6 +658,388 @@
           <pc:docMk/>
           <pc:sldMk cId="583108267" sldId="336"/>
         </pc:sldMkLst>
+      </pc:sldChg>
+    </pc:docChg>
+  </pc:docChgLst>
+  <pc:docChgLst>
+    <pc:chgData name="Jean-Pierre Duchesneau" userId="a41dad7d-4331-478d-884a-a37b1c6c6add" providerId="ADAL" clId="{E98B3899-DC4E-4893-976A-FAD88EAC8D31}"/>
+    <pc:docChg chg="undo custSel addSld delSld modSld sldOrd modSection">
+      <pc:chgData name="Jean-Pierre Duchesneau" userId="a41dad7d-4331-478d-884a-a37b1c6c6add" providerId="ADAL" clId="{E98B3899-DC4E-4893-976A-FAD88EAC8D31}" dt="2021-06-01T15:01:41.689" v="453"/>
+      <pc:docMkLst>
+        <pc:docMk/>
+      </pc:docMkLst>
+      <pc:sldChg chg="addSp">
+        <pc:chgData name="Jean-Pierre Duchesneau" userId="a41dad7d-4331-478d-884a-a37b1c6c6add" providerId="ADAL" clId="{E98B3899-DC4E-4893-976A-FAD88EAC8D31}" dt="2021-06-01T15:00:07.677" v="449"/>
+        <pc:sldMkLst>
+          <pc:docMk/>
+          <pc:sldMk cId="2471807738" sldId="256"/>
+        </pc:sldMkLst>
+        <pc:spChg chg="add">
+          <ac:chgData name="Jean-Pierre Duchesneau" userId="a41dad7d-4331-478d-884a-a37b1c6c6add" providerId="ADAL" clId="{E98B3899-DC4E-4893-976A-FAD88EAC8D31}" dt="2021-06-01T14:59:07.154" v="446"/>
+          <ac:spMkLst>
+            <pc:docMk/>
+            <pc:sldMk cId="2471807738" sldId="256"/>
+            <ac:spMk id="5" creationId="{125248BF-4B06-4B31-8FFC-4B0BC4152512}"/>
+          </ac:spMkLst>
+        </pc:spChg>
+        <pc:spChg chg="add">
+          <ac:chgData name="Jean-Pierre Duchesneau" userId="a41dad7d-4331-478d-884a-a37b1c6c6add" providerId="ADAL" clId="{E98B3899-DC4E-4893-976A-FAD88EAC8D31}" dt="2021-06-01T14:59:43.404" v="447"/>
+          <ac:spMkLst>
+            <pc:docMk/>
+            <pc:sldMk cId="2471807738" sldId="256"/>
+            <ac:spMk id="6" creationId="{9CC8EAB1-08CF-4C9F-9830-58B49DBD30B0}"/>
+          </ac:spMkLst>
+        </pc:spChg>
+        <pc:spChg chg="add">
+          <ac:chgData name="Jean-Pierre Duchesneau" userId="a41dad7d-4331-478d-884a-a37b1c6c6add" providerId="ADAL" clId="{E98B3899-DC4E-4893-976A-FAD88EAC8D31}" dt="2021-06-01T15:00:07.677" v="449"/>
+          <ac:spMkLst>
+            <pc:docMk/>
+            <pc:sldMk cId="2471807738" sldId="256"/>
+            <ac:spMk id="7" creationId="{47D42A16-CD8F-48F0-A2B3-A504B3E4CB6A}"/>
+          </ac:spMkLst>
+        </pc:spChg>
+      </pc:sldChg>
+      <pc:sldChg chg="addSp modSp">
+        <pc:chgData name="Jean-Pierre Duchesneau" userId="a41dad7d-4331-478d-884a-a37b1c6c6add" providerId="ADAL" clId="{E98B3899-DC4E-4893-976A-FAD88EAC8D31}" dt="2021-06-01T15:01:09.318" v="452" actId="14100"/>
+        <pc:sldMkLst>
+          <pc:docMk/>
+          <pc:sldMk cId="2100286677" sldId="257"/>
+        </pc:sldMkLst>
+        <pc:spChg chg="add">
+          <ac:chgData name="Jean-Pierre Duchesneau" userId="a41dad7d-4331-478d-884a-a37b1c6c6add" providerId="ADAL" clId="{E98B3899-DC4E-4893-976A-FAD88EAC8D31}" dt="2021-06-01T14:59:50.557" v="448"/>
+          <ac:spMkLst>
+            <pc:docMk/>
+            <pc:sldMk cId="2100286677" sldId="257"/>
+            <ac:spMk id="4" creationId="{91245206-A260-4FEA-B579-F575B01A1E20}"/>
+          </ac:spMkLst>
+        </pc:spChg>
+        <pc:spChg chg="add">
+          <ac:chgData name="Jean-Pierre Duchesneau" userId="a41dad7d-4331-478d-884a-a37b1c6c6add" providerId="ADAL" clId="{E98B3899-DC4E-4893-976A-FAD88EAC8D31}" dt="2021-06-01T15:00:30.697" v="450"/>
+          <ac:spMkLst>
+            <pc:docMk/>
+            <pc:sldMk cId="2100286677" sldId="257"/>
+            <ac:spMk id="5" creationId="{44D8AA59-83BE-4737-A040-FA3763FF15AB}"/>
+          </ac:spMkLst>
+        </pc:spChg>
+        <pc:spChg chg="add mod">
+          <ac:chgData name="Jean-Pierre Duchesneau" userId="a41dad7d-4331-478d-884a-a37b1c6c6add" providerId="ADAL" clId="{E98B3899-DC4E-4893-976A-FAD88EAC8D31}" dt="2021-06-01T15:01:09.318" v="452" actId="14100"/>
+          <ac:spMkLst>
+            <pc:docMk/>
+            <pc:sldMk cId="2100286677" sldId="257"/>
+            <ac:spMk id="6" creationId="{8DBD436A-4430-4936-B03A-450AFD77AF58}"/>
+          </ac:spMkLst>
+        </pc:spChg>
+      </pc:sldChg>
+      <pc:sldChg chg="addSp">
+        <pc:chgData name="Jean-Pierre Duchesneau" userId="a41dad7d-4331-478d-884a-a37b1c6c6add" providerId="ADAL" clId="{E98B3899-DC4E-4893-976A-FAD88EAC8D31}" dt="2021-06-01T15:01:41.689" v="453"/>
+        <pc:sldMkLst>
+          <pc:docMk/>
+          <pc:sldMk cId="2490107299" sldId="260"/>
+        </pc:sldMkLst>
+        <pc:spChg chg="add">
+          <ac:chgData name="Jean-Pierre Duchesneau" userId="a41dad7d-4331-478d-884a-a37b1c6c6add" providerId="ADAL" clId="{E98B3899-DC4E-4893-976A-FAD88EAC8D31}" dt="2021-06-01T15:01:41.689" v="453"/>
+          <ac:spMkLst>
+            <pc:docMk/>
+            <pc:sldMk cId="2490107299" sldId="260"/>
+            <ac:spMk id="4" creationId="{C78D66F1-1235-490E-9B44-371DD3838E15}"/>
+          </ac:spMkLst>
+        </pc:spChg>
+      </pc:sldChg>
+      <pc:sldChg chg="modSp mod">
+        <pc:chgData name="Jean-Pierre Duchesneau" userId="a41dad7d-4331-478d-884a-a37b1c6c6add" providerId="ADAL" clId="{E98B3899-DC4E-4893-976A-FAD88EAC8D31}" dt="2021-06-01T14:32:39.836" v="235" actId="207"/>
+        <pc:sldMkLst>
+          <pc:docMk/>
+          <pc:sldMk cId="4256874079" sldId="263"/>
+        </pc:sldMkLst>
+        <pc:spChg chg="mod">
+          <ac:chgData name="Jean-Pierre Duchesneau" userId="a41dad7d-4331-478d-884a-a37b1c6c6add" providerId="ADAL" clId="{E98B3899-DC4E-4893-976A-FAD88EAC8D31}" dt="2021-06-01T14:32:39.836" v="235" actId="207"/>
+          <ac:spMkLst>
+            <pc:docMk/>
+            <pc:sldMk cId="4256874079" sldId="263"/>
+            <ac:spMk id="3" creationId="{F8F37365-9CCF-49DD-B056-EC8237974D07}"/>
+          </ac:spMkLst>
+        </pc:spChg>
+      </pc:sldChg>
+      <pc:sldChg chg="addSp delSp modSp add del mod">
+        <pc:chgData name="Jean-Pierre Duchesneau" userId="a41dad7d-4331-478d-884a-a37b1c6c6add" providerId="ADAL" clId="{E98B3899-DC4E-4893-976A-FAD88EAC8D31}" dt="2021-06-01T14:04:26.009" v="6" actId="14100"/>
+        <pc:sldMkLst>
+          <pc:docMk/>
+          <pc:sldMk cId="3228696591" sldId="264"/>
+        </pc:sldMkLst>
+        <pc:spChg chg="add mod">
+          <ac:chgData name="Jean-Pierre Duchesneau" userId="a41dad7d-4331-478d-884a-a37b1c6c6add" providerId="ADAL" clId="{E98B3899-DC4E-4893-976A-FAD88EAC8D31}" dt="2021-06-01T14:04:14.652" v="2" actId="478"/>
+          <ac:spMkLst>
+            <pc:docMk/>
+            <pc:sldMk cId="3228696591" sldId="264"/>
+            <ac:spMk id="4" creationId="{96BA4AEE-6145-41D6-B599-8B36EBCA14CB}"/>
+          </ac:spMkLst>
+        </pc:spChg>
+        <pc:picChg chg="del">
+          <ac:chgData name="Jean-Pierre Duchesneau" userId="a41dad7d-4331-478d-884a-a37b1c6c6add" providerId="ADAL" clId="{E98B3899-DC4E-4893-976A-FAD88EAC8D31}" dt="2021-06-01T14:04:14.652" v="2" actId="478"/>
+          <ac:picMkLst>
+            <pc:docMk/>
+            <pc:sldMk cId="3228696591" sldId="264"/>
+            <ac:picMk id="5" creationId="{CC7FEB24-7592-4A94-96FE-2E44FF64ABE1}"/>
+          </ac:picMkLst>
+        </pc:picChg>
+        <pc:picChg chg="add mod">
+          <ac:chgData name="Jean-Pierre Duchesneau" userId="a41dad7d-4331-478d-884a-a37b1c6c6add" providerId="ADAL" clId="{E98B3899-DC4E-4893-976A-FAD88EAC8D31}" dt="2021-06-01T14:04:26.009" v="6" actId="14100"/>
+          <ac:picMkLst>
+            <pc:docMk/>
+            <pc:sldMk cId="3228696591" sldId="264"/>
+            <ac:picMk id="6" creationId="{E8726B0E-7C19-4971-BB67-8F46AD6A5AE6}"/>
+          </ac:picMkLst>
+        </pc:picChg>
+      </pc:sldChg>
+      <pc:sldChg chg="addSp delSp modSp new mod">
+        <pc:chgData name="Jean-Pierre Duchesneau" userId="a41dad7d-4331-478d-884a-a37b1c6c6add" providerId="ADAL" clId="{E98B3899-DC4E-4893-976A-FAD88EAC8D31}" dt="2021-06-01T14:29:14.506" v="189" actId="1076"/>
+        <pc:sldMkLst>
+          <pc:docMk/>
+          <pc:sldMk cId="334105744" sldId="265"/>
+        </pc:sldMkLst>
+        <pc:spChg chg="mod">
+          <ac:chgData name="Jean-Pierre Duchesneau" userId="a41dad7d-4331-478d-884a-a37b1c6c6add" providerId="ADAL" clId="{E98B3899-DC4E-4893-976A-FAD88EAC8D31}" dt="2021-06-01T14:06:49.272" v="35" actId="20577"/>
+          <ac:spMkLst>
+            <pc:docMk/>
+            <pc:sldMk cId="334105744" sldId="265"/>
+            <ac:spMk id="2" creationId="{9C6E44C4-EABC-4E03-ADD9-57A94F664AD8}"/>
+          </ac:spMkLst>
+        </pc:spChg>
+        <pc:spChg chg="mod">
+          <ac:chgData name="Jean-Pierre Duchesneau" userId="a41dad7d-4331-478d-884a-a37b1c6c6add" providerId="ADAL" clId="{E98B3899-DC4E-4893-976A-FAD88EAC8D31}" dt="2021-06-01T14:21:01.524" v="183" actId="21"/>
+          <ac:spMkLst>
+            <pc:docMk/>
+            <pc:sldMk cId="334105744" sldId="265"/>
+            <ac:spMk id="3" creationId="{481E7386-96A9-4091-9C2F-C027BD6CBFFE}"/>
+          </ac:spMkLst>
+        </pc:spChg>
+        <pc:picChg chg="add del">
+          <ac:chgData name="Jean-Pierre Duchesneau" userId="a41dad7d-4331-478d-884a-a37b1c6c6add" providerId="ADAL" clId="{E98B3899-DC4E-4893-976A-FAD88EAC8D31}" dt="2021-06-01T14:20:42.467" v="178" actId="478"/>
+          <ac:picMkLst>
+            <pc:docMk/>
+            <pc:sldMk cId="334105744" sldId="265"/>
+            <ac:picMk id="4" creationId="{CAF1E4C8-10E3-4ED5-8535-B48D34F10FEE}"/>
+          </ac:picMkLst>
+        </pc:picChg>
+        <pc:picChg chg="add mod">
+          <ac:chgData name="Jean-Pierre Duchesneau" userId="a41dad7d-4331-478d-884a-a37b1c6c6add" providerId="ADAL" clId="{E98B3899-DC4E-4893-976A-FAD88EAC8D31}" dt="2021-06-01T14:29:14.506" v="189" actId="1076"/>
+          <ac:picMkLst>
+            <pc:docMk/>
+            <pc:sldMk cId="334105744" sldId="265"/>
+            <ac:picMk id="5" creationId="{0D12C34D-CF3C-4B48-8226-5CC63BF05AC2}"/>
+          </ac:picMkLst>
+        </pc:picChg>
+      </pc:sldChg>
+      <pc:sldChg chg="addSp modSp new mod">
+        <pc:chgData name="Jean-Pierre Duchesneau" userId="a41dad7d-4331-478d-884a-a37b1c6c6add" providerId="ADAL" clId="{E98B3899-DC4E-4893-976A-FAD88EAC8D31}" dt="2021-06-01T14:20:11.852" v="177" actId="20577"/>
+        <pc:sldMkLst>
+          <pc:docMk/>
+          <pc:sldMk cId="643500694" sldId="266"/>
+        </pc:sldMkLst>
+        <pc:spChg chg="mod">
+          <ac:chgData name="Jean-Pierre Duchesneau" userId="a41dad7d-4331-478d-884a-a37b1c6c6add" providerId="ADAL" clId="{E98B3899-DC4E-4893-976A-FAD88EAC8D31}" dt="2021-06-01T14:20:11.852" v="177" actId="20577"/>
+          <ac:spMkLst>
+            <pc:docMk/>
+            <pc:sldMk cId="643500694" sldId="266"/>
+            <ac:spMk id="2" creationId="{F74F003B-D428-46AB-AEB1-C33F887EAA50}"/>
+          </ac:spMkLst>
+        </pc:spChg>
+        <pc:picChg chg="add mod">
+          <ac:chgData name="Jean-Pierre Duchesneau" userId="a41dad7d-4331-478d-884a-a37b1c6c6add" providerId="ADAL" clId="{E98B3899-DC4E-4893-976A-FAD88EAC8D31}" dt="2021-06-01T14:20:02.865" v="133" actId="1076"/>
+          <ac:picMkLst>
+            <pc:docMk/>
+            <pc:sldMk cId="643500694" sldId="266"/>
+            <ac:picMk id="4" creationId="{7696D6FF-A750-4055-8EA5-209FC63070CB}"/>
+          </ac:picMkLst>
+        </pc:picChg>
+      </pc:sldChg>
+      <pc:sldChg chg="addSp delSp modSp add mod">
+        <pc:chgData name="Jean-Pierre Duchesneau" userId="a41dad7d-4331-478d-884a-a37b1c6c6add" providerId="ADAL" clId="{E98B3899-DC4E-4893-976A-FAD88EAC8D31}" dt="2021-06-01T14:28:31.107" v="188" actId="1076"/>
+        <pc:sldMkLst>
+          <pc:docMk/>
+          <pc:sldMk cId="282074698" sldId="267"/>
+        </pc:sldMkLst>
+        <pc:spChg chg="mod">
+          <ac:chgData name="Jean-Pierre Duchesneau" userId="a41dad7d-4331-478d-884a-a37b1c6c6add" providerId="ADAL" clId="{E98B3899-DC4E-4893-976A-FAD88EAC8D31}" dt="2021-06-01T14:21:10.281" v="185"/>
+          <ac:spMkLst>
+            <pc:docMk/>
+            <pc:sldMk cId="282074698" sldId="267"/>
+            <ac:spMk id="3" creationId="{481E7386-96A9-4091-9C2F-C027BD6CBFFE}"/>
+          </ac:spMkLst>
+        </pc:spChg>
+        <pc:picChg chg="add mod">
+          <ac:chgData name="Jean-Pierre Duchesneau" userId="a41dad7d-4331-478d-884a-a37b1c6c6add" providerId="ADAL" clId="{E98B3899-DC4E-4893-976A-FAD88EAC8D31}" dt="2021-06-01T14:28:31.107" v="188" actId="1076"/>
+          <ac:picMkLst>
+            <pc:docMk/>
+            <pc:sldMk cId="282074698" sldId="267"/>
+            <ac:picMk id="4" creationId="{6795CC2F-194F-41B0-BC70-5A4D1172BE2F}"/>
+          </ac:picMkLst>
+        </pc:picChg>
+        <pc:picChg chg="del">
+          <ac:chgData name="Jean-Pierre Duchesneau" userId="a41dad7d-4331-478d-884a-a37b1c6c6add" providerId="ADAL" clId="{E98B3899-DC4E-4893-976A-FAD88EAC8D31}" dt="2021-06-01T14:21:12.162" v="186" actId="478"/>
+          <ac:picMkLst>
+            <pc:docMk/>
+            <pc:sldMk cId="282074698" sldId="267"/>
+            <ac:picMk id="5" creationId="{0D12C34D-CF3C-4B48-8226-5CC63BF05AC2}"/>
+          </ac:picMkLst>
+        </pc:picChg>
+      </pc:sldChg>
+      <pc:sldChg chg="addSp modSp new mod ord">
+        <pc:chgData name="Jean-Pierre Duchesneau" userId="a41dad7d-4331-478d-884a-a37b1c6c6add" providerId="ADAL" clId="{E98B3899-DC4E-4893-976A-FAD88EAC8D31}" dt="2021-06-01T14:30:45.918" v="233"/>
+        <pc:sldMkLst>
+          <pc:docMk/>
+          <pc:sldMk cId="1523883165" sldId="268"/>
+        </pc:sldMkLst>
+        <pc:spChg chg="mod">
+          <ac:chgData name="Jean-Pierre Duchesneau" userId="a41dad7d-4331-478d-884a-a37b1c6c6add" providerId="ADAL" clId="{E98B3899-DC4E-4893-976A-FAD88EAC8D31}" dt="2021-06-01T14:30:21.881" v="229" actId="20577"/>
+          <ac:spMkLst>
+            <pc:docMk/>
+            <pc:sldMk cId="1523883165" sldId="268"/>
+            <ac:spMk id="2" creationId="{447AC09D-E228-418C-8FE1-DF936ABBA677}"/>
+          </ac:spMkLst>
+        </pc:spChg>
+        <pc:picChg chg="add mod">
+          <ac:chgData name="Jean-Pierre Duchesneau" userId="a41dad7d-4331-478d-884a-a37b1c6c6add" providerId="ADAL" clId="{E98B3899-DC4E-4893-976A-FAD88EAC8D31}" dt="2021-06-01T14:30:29.855" v="231" actId="14100"/>
+          <ac:picMkLst>
+            <pc:docMk/>
+            <pc:sldMk cId="1523883165" sldId="268"/>
+            <ac:picMk id="4" creationId="{FDE59116-3120-4407-9DDE-332D35FA354F}"/>
+          </ac:picMkLst>
+        </pc:picChg>
+      </pc:sldChg>
+      <pc:sldChg chg="addSp delSp modSp new mod">
+        <pc:chgData name="Jean-Pierre Duchesneau" userId="a41dad7d-4331-478d-884a-a37b1c6c6add" providerId="ADAL" clId="{E98B3899-DC4E-4893-976A-FAD88EAC8D31}" dt="2021-06-01T14:46:59.426" v="404" actId="1076"/>
+        <pc:sldMkLst>
+          <pc:docMk/>
+          <pc:sldMk cId="1371179424" sldId="269"/>
+        </pc:sldMkLst>
+        <pc:spChg chg="mod">
+          <ac:chgData name="Jean-Pierre Duchesneau" userId="a41dad7d-4331-478d-884a-a37b1c6c6add" providerId="ADAL" clId="{E98B3899-DC4E-4893-976A-FAD88EAC8D31}" dt="2021-06-01T14:38:31.047" v="382" actId="27636"/>
+          <ac:spMkLst>
+            <pc:docMk/>
+            <pc:sldMk cId="1371179424" sldId="269"/>
+            <ac:spMk id="2" creationId="{E7EDF541-4B29-442E-8F5F-F791C223A885}"/>
+          </ac:spMkLst>
+        </pc:spChg>
+        <pc:spChg chg="del mod">
+          <ac:chgData name="Jean-Pierre Duchesneau" userId="a41dad7d-4331-478d-884a-a37b1c6c6add" providerId="ADAL" clId="{E98B3899-DC4E-4893-976A-FAD88EAC8D31}" dt="2021-06-01T14:38:49.475" v="385" actId="478"/>
+          <ac:spMkLst>
+            <pc:docMk/>
+            <pc:sldMk cId="1371179424" sldId="269"/>
+            <ac:spMk id="3" creationId="{E37F62A1-A71A-4D23-BC85-C1ECBC527579}"/>
+          </ac:spMkLst>
+        </pc:spChg>
+        <pc:spChg chg="add del mod">
+          <ac:chgData name="Jean-Pierre Duchesneau" userId="a41dad7d-4331-478d-884a-a37b1c6c6add" providerId="ADAL" clId="{E98B3899-DC4E-4893-976A-FAD88EAC8D31}" dt="2021-06-01T14:38:56.419" v="386" actId="478"/>
+          <ac:spMkLst>
+            <pc:docMk/>
+            <pc:sldMk cId="1371179424" sldId="269"/>
+            <ac:spMk id="10" creationId="{CEF830FA-8296-4BBA-B797-266CEADE891D}"/>
+          </ac:spMkLst>
+        </pc:spChg>
+        <pc:spChg chg="add del mod">
+          <ac:chgData name="Jean-Pierre Duchesneau" userId="a41dad7d-4331-478d-884a-a37b1c6c6add" providerId="ADAL" clId="{E98B3899-DC4E-4893-976A-FAD88EAC8D31}" dt="2021-06-01T14:45:38.460" v="400" actId="478"/>
+          <ac:spMkLst>
+            <pc:docMk/>
+            <pc:sldMk cId="1371179424" sldId="269"/>
+            <ac:spMk id="12" creationId="{39EC5052-030B-4FE3-9451-4FA0DBB2352C}"/>
+          </ac:spMkLst>
+        </pc:spChg>
+        <pc:spChg chg="add mod">
+          <ac:chgData name="Jean-Pierre Duchesneau" userId="a41dad7d-4331-478d-884a-a37b1c6c6add" providerId="ADAL" clId="{E98B3899-DC4E-4893-976A-FAD88EAC8D31}" dt="2021-06-01T14:45:53.428" v="402" actId="13822"/>
+          <ac:spMkLst>
+            <pc:docMk/>
+            <pc:sldMk cId="1371179424" sldId="269"/>
+            <ac:spMk id="13" creationId="{BC27F137-0663-4E8D-B491-085AC5FD7AC4}"/>
+          </ac:spMkLst>
+        </pc:spChg>
+        <pc:spChg chg="add mod">
+          <ac:chgData name="Jean-Pierre Duchesneau" userId="a41dad7d-4331-478d-884a-a37b1c6c6add" providerId="ADAL" clId="{E98B3899-DC4E-4893-976A-FAD88EAC8D31}" dt="2021-06-01T14:46:59.426" v="404" actId="1076"/>
+          <ac:spMkLst>
+            <pc:docMk/>
+            <pc:sldMk cId="1371179424" sldId="269"/>
+            <ac:spMk id="14" creationId="{1399D7D2-2A39-4E67-8990-E10BC771279B}"/>
+          </ac:spMkLst>
+        </pc:spChg>
+        <pc:picChg chg="add mod">
+          <ac:chgData name="Jean-Pierre Duchesneau" userId="a41dad7d-4331-478d-884a-a37b1c6c6add" providerId="ADAL" clId="{E98B3899-DC4E-4893-976A-FAD88EAC8D31}" dt="2021-06-01T14:38:12.882" v="369" actId="14100"/>
+          <ac:picMkLst>
+            <pc:docMk/>
+            <pc:sldMk cId="1371179424" sldId="269"/>
+            <ac:picMk id="5" creationId="{1CDA411E-C155-4617-8865-B9445210561D}"/>
+          </ac:picMkLst>
+        </pc:picChg>
+        <pc:picChg chg="add mod">
+          <ac:chgData name="Jean-Pierre Duchesneau" userId="a41dad7d-4331-478d-884a-a37b1c6c6add" providerId="ADAL" clId="{E98B3899-DC4E-4893-976A-FAD88EAC8D31}" dt="2021-06-01T14:38:44.672" v="384" actId="1076"/>
+          <ac:picMkLst>
+            <pc:docMk/>
+            <pc:sldMk cId="1371179424" sldId="269"/>
+            <ac:picMk id="6" creationId="{2D13018D-048D-4573-A68E-083A257C47CF}"/>
+          </ac:picMkLst>
+        </pc:picChg>
+        <pc:cxnChg chg="add mod">
+          <ac:chgData name="Jean-Pierre Duchesneau" userId="a41dad7d-4331-478d-884a-a37b1c6c6add" providerId="ADAL" clId="{E98B3899-DC4E-4893-976A-FAD88EAC8D31}" dt="2021-06-01T14:39:55.986" v="388" actId="14100"/>
+          <ac:cxnSpMkLst>
+            <pc:docMk/>
+            <pc:sldMk cId="1371179424" sldId="269"/>
+            <ac:cxnSpMk id="8" creationId="{A824C00A-B2E1-45C5-B087-AD218F522015}"/>
+          </ac:cxnSpMkLst>
+        </pc:cxnChg>
+      </pc:sldChg>
+      <pc:sldChg chg="addSp modSp new mod">
+        <pc:chgData name="Jean-Pierre Duchesneau" userId="a41dad7d-4331-478d-884a-a37b1c6c6add" providerId="ADAL" clId="{E98B3899-DC4E-4893-976A-FAD88EAC8D31}" dt="2021-06-01T14:51:55.388" v="445" actId="14100"/>
+        <pc:sldMkLst>
+          <pc:docMk/>
+          <pc:sldMk cId="683642893" sldId="270"/>
+        </pc:sldMkLst>
+        <pc:spChg chg="add mod">
+          <ac:chgData name="Jean-Pierre Duchesneau" userId="a41dad7d-4331-478d-884a-a37b1c6c6add" providerId="ADAL" clId="{E98B3899-DC4E-4893-976A-FAD88EAC8D31}" dt="2021-06-01T14:47:58.344" v="413" actId="14100"/>
+          <ac:spMkLst>
+            <pc:docMk/>
+            <pc:sldMk cId="683642893" sldId="270"/>
+            <ac:spMk id="6" creationId="{7D56AB75-9031-44FD-AE57-2CDA7A2ACD4A}"/>
+          </ac:spMkLst>
+        </pc:spChg>
+        <pc:spChg chg="add mod">
+          <ac:chgData name="Jean-Pierre Duchesneau" userId="a41dad7d-4331-478d-884a-a37b1c6c6add" providerId="ADAL" clId="{E98B3899-DC4E-4893-976A-FAD88EAC8D31}" dt="2021-06-01T14:48:45.257" v="419" actId="20577"/>
+          <ac:spMkLst>
+            <pc:docMk/>
+            <pc:sldMk cId="683642893" sldId="270"/>
+            <ac:spMk id="7" creationId="{B9BB7395-9588-4D50-A8DB-0D5A4778BB1C}"/>
+          </ac:spMkLst>
+        </pc:spChg>
+        <pc:spChg chg="add mod">
+          <ac:chgData name="Jean-Pierre Duchesneau" userId="a41dad7d-4331-478d-884a-a37b1c6c6add" providerId="ADAL" clId="{E98B3899-DC4E-4893-976A-FAD88EAC8D31}" dt="2021-06-01T14:49:24.282" v="421" actId="1076"/>
+          <ac:spMkLst>
+            <pc:docMk/>
+            <pc:sldMk cId="683642893" sldId="270"/>
+            <ac:spMk id="8" creationId="{A52E06A9-4D02-4492-943C-F8C3C4114ADF}"/>
+          </ac:spMkLst>
+        </pc:spChg>
+        <pc:spChg chg="add mod">
+          <ac:chgData name="Jean-Pierre Duchesneau" userId="a41dad7d-4331-478d-884a-a37b1c6c6add" providerId="ADAL" clId="{E98B3899-DC4E-4893-976A-FAD88EAC8D31}" dt="2021-06-01T14:51:55.388" v="445" actId="14100"/>
+          <ac:spMkLst>
+            <pc:docMk/>
+            <pc:sldMk cId="683642893" sldId="270"/>
+            <ac:spMk id="9" creationId="{2F3C7780-FC5A-4E8D-8FF9-5DC91D364ED3}"/>
+          </ac:spMkLst>
+        </pc:spChg>
+        <pc:picChg chg="add mod">
+          <ac:chgData name="Jean-Pierre Duchesneau" userId="a41dad7d-4331-478d-884a-a37b1c6c6add" providerId="ADAL" clId="{E98B3899-DC4E-4893-976A-FAD88EAC8D31}" dt="2021-06-01T14:42:49.789" v="391" actId="14100"/>
+          <ac:picMkLst>
+            <pc:docMk/>
+            <pc:sldMk cId="683642893" sldId="270"/>
+            <ac:picMk id="4" creationId="{A70E77EC-91DB-46E4-A39D-B9524752913F}"/>
+          </ac:picMkLst>
+        </pc:picChg>
+        <pc:picChg chg="add mod">
+          <ac:chgData name="Jean-Pierre Duchesneau" userId="a41dad7d-4331-478d-884a-a37b1c6c6add" providerId="ADAL" clId="{E98B3899-DC4E-4893-976A-FAD88EAC8D31}" dt="2021-06-01T14:44:26.430" v="396" actId="14100"/>
+          <ac:picMkLst>
+            <pc:docMk/>
+            <pc:sldMk cId="683642893" sldId="270"/>
+            <ac:picMk id="5" creationId="{55F7A84D-8AF3-4D3F-967A-166A74124E2B}"/>
+          </ac:picMkLst>
+        </pc:picChg>
       </pc:sldChg>
     </pc:docChg>
   </pc:docChgLst>
@@ -8813,7 +9207,7 @@
             <a:pPr rtl="0"/>
             <a:fld id="{153B9F70-C9FE-45FE-8BA2-11B9BDB0807C}" type="datetime1">
               <a:rPr lang="fr-FR" smtClean="0"/>
-              <a:t>27/05/2021</a:t>
+              <a:t>01/06/2021</a:t>
             </a:fld>
             <a:endParaRPr lang="fr-FR" dirty="0"/>
           </a:p>
@@ -8983,7 +9377,7 @@
             <a:pPr rtl="0"/>
             <a:fld id="{722DDE82-2D54-4AB2-8114-EB06BAB63866}" type="datetime1">
               <a:rPr lang="fr-FR" noProof="0" smtClean="0"/>
-              <a:t>27/05/2021</a:t>
+              <a:t>01/06/2021</a:t>
             </a:fld>
             <a:endParaRPr lang="fr-FR" noProof="0" dirty="0"/>
           </a:p>
@@ -9434,6 +9828,91 @@
 </p:notes>
 </file>
 
+<file path=ppt/notesSlides/notesSlide3.xml><?xml version="1.0" encoding="utf-8"?>
+<p:notes xmlns:a="http://schemas.openxmlformats.org/drawingml/2006/main" xmlns:r="http://schemas.openxmlformats.org/officeDocument/2006/relationships" xmlns:p="http://schemas.openxmlformats.org/presentationml/2006/main">
+  <p:cSld>
+    <p:spTree>
+      <p:nvGrpSpPr>
+        <p:cNvPr id="1" name=""/>
+        <p:cNvGrpSpPr/>
+        <p:nvPr/>
+      </p:nvGrpSpPr>
+      <p:grpSpPr>
+        <a:xfrm>
+          <a:off x="0" y="0"/>
+          <a:ext cx="0" cy="0"/>
+          <a:chOff x="0" y="0"/>
+          <a:chExt cx="0" cy="0"/>
+        </a:xfrm>
+      </p:grpSpPr>
+      <p:sp>
+        <p:nvSpPr>
+          <p:cNvPr id="2" name="Espace réservé de l'image des diapositives 1"/>
+          <p:cNvSpPr>
+            <a:spLocks noGrp="1" noRot="1" noChangeAspect="1"/>
+          </p:cNvSpPr>
+          <p:nvPr>
+            <p:ph type="sldImg"/>
+          </p:nvPr>
+        </p:nvSpPr>
+        <p:spPr/>
+      </p:sp>
+      <p:sp>
+        <p:nvSpPr>
+          <p:cNvPr id="3" name="Espace réservé des notes 2"/>
+          <p:cNvSpPr>
+            <a:spLocks noGrp="1"/>
+          </p:cNvSpPr>
+          <p:nvPr>
+            <p:ph type="body" idx="1"/>
+          </p:nvPr>
+        </p:nvSpPr>
+        <p:spPr/>
+        <p:txBody>
+          <a:bodyPr/>
+          <a:lstStyle/>
+          <a:p>
+            <a:endParaRPr lang="fr-CA" dirty="0"/>
+          </a:p>
+        </p:txBody>
+      </p:sp>
+      <p:sp>
+        <p:nvSpPr>
+          <p:cNvPr id="4" name="Espace réservé du numéro de diapositive 3"/>
+          <p:cNvSpPr>
+            <a:spLocks noGrp="1"/>
+          </p:cNvSpPr>
+          <p:nvPr>
+            <p:ph type="sldNum" sz="quarter" idx="5"/>
+          </p:nvPr>
+        </p:nvSpPr>
+        <p:spPr/>
+        <p:txBody>
+          <a:bodyPr/>
+          <a:lstStyle/>
+          <a:p>
+            <a:pPr rtl="0"/>
+            <a:fld id="{DF61EA0F-A667-4B49-8422-0062BC55E249}" type="slidenum">
+              <a:rPr lang="fr-FR" noProof="0" smtClean="0"/>
+              <a:t>11</a:t>
+            </a:fld>
+            <a:endParaRPr lang="fr-FR" noProof="0" dirty="0"/>
+          </a:p>
+        </p:txBody>
+      </p:sp>
+    </p:spTree>
+    <p:extLst>
+      <p:ext uri="{BB962C8B-B14F-4D97-AF65-F5344CB8AC3E}">
+        <p14:creationId xmlns:p14="http://schemas.microsoft.com/office/powerpoint/2010/main" val="3244106555"/>
+      </p:ext>
+    </p:extLst>
+  </p:cSld>
+  <p:clrMapOvr>
+    <a:masterClrMapping/>
+  </p:clrMapOvr>
+</p:notes>
+</file>
+
 <file path=ppt/slideLayouts/slideLayout1.xml><?xml version="1.0" encoding="utf-8"?>
 <p:sldLayout xmlns:a="http://schemas.openxmlformats.org/drawingml/2006/main" xmlns:r="http://schemas.openxmlformats.org/officeDocument/2006/relationships" xmlns:p="http://schemas.openxmlformats.org/presentationml/2006/main" preserve="1" userDrawn="1">
   <p:cSld name="Diapositive de titre">
@@ -9875,7 +10354,7 @@
             <a:pPr rtl="0"/>
             <a:fld id="{4F100C82-D502-454B-9D54-D5DEB14EB94C}" type="datetime1">
               <a:rPr lang="fr-FR" noProof="0" smtClean="0"/>
-              <a:t>27/05/2021</a:t>
+              <a:t>01/06/2021</a:t>
             </a:fld>
             <a:endParaRPr lang="fr-FR" noProof="0" dirty="0"/>
           </a:p>
@@ -10539,7 +11018,7 @@
             <a:pPr rtl="0"/>
             <a:fld id="{2E4A3FCC-7018-480A-9973-FBF3BF4CEEDD}" type="datetime1">
               <a:rPr lang="fr-FR" noProof="0" smtClean="0"/>
-              <a:t>27/05/2021</a:t>
+              <a:t>01/06/2021</a:t>
             </a:fld>
             <a:endParaRPr lang="fr-FR" noProof="0" dirty="0"/>
           </a:p>
@@ -11118,10 +11597,1363 @@
           </a:p>
         </p:txBody>
       </p:sp>
+      <p:sp>
+        <p:nvSpPr>
+          <p:cNvPr id="5" name="ZoneTexte 4">
+            <a:extLst>
+              <a:ext uri="{FF2B5EF4-FFF2-40B4-BE49-F238E27FC236}">
+                <a16:creationId xmlns:a16="http://schemas.microsoft.com/office/drawing/2014/main" id="{125248BF-4B06-4B31-8FFC-4B0BC4152512}"/>
+              </a:ext>
+            </a:extLst>
+          </p:cNvPr>
+          <p:cNvSpPr txBox="1"/>
+          <p:nvPr>
+            <p:custDataLst>
+              <p:tags r:id="rId4"/>
+            </p:custDataLst>
+          </p:nvPr>
+        </p:nvSpPr>
+        <p:spPr>
+          <a:xfrm>
+            <a:off x="0" y="0"/>
+            <a:ext cx="3810000" cy="1270000"/>
+          </a:xfrm>
+          <a:prstGeom prst="rect">
+            <a:avLst/>
+          </a:prstGeom>
+          <a:noFill/>
+        </p:spPr>
+        <p:txBody>
+          <a:bodyPr vert="horz" rtlCol="0">
+            <a:spAutoFit/>
+          </a:bodyPr>
+          <a:lstStyle/>
+          <a:p>
+            <a:endParaRPr lang="fr-CA"/>
+          </a:p>
+        </p:txBody>
+      </p:sp>
+      <p:sp>
+        <p:nvSpPr>
+          <p:cNvPr id="6" name="ZoneTexte 5">
+            <a:extLst>
+              <a:ext uri="{FF2B5EF4-FFF2-40B4-BE49-F238E27FC236}">
+                <a16:creationId xmlns:a16="http://schemas.microsoft.com/office/drawing/2014/main" id="{9CC8EAB1-08CF-4C9F-9830-58B49DBD30B0}"/>
+              </a:ext>
+            </a:extLst>
+          </p:cNvPr>
+          <p:cNvSpPr txBox="1"/>
+          <p:nvPr>
+            <p:custDataLst>
+              <p:tags r:id="rId5"/>
+            </p:custDataLst>
+          </p:nvPr>
+        </p:nvSpPr>
+        <p:spPr>
+          <a:xfrm>
+            <a:off x="0" y="0"/>
+            <a:ext cx="3810000" cy="1270000"/>
+          </a:xfrm>
+          <a:prstGeom prst="rect">
+            <a:avLst/>
+          </a:prstGeom>
+          <a:noFill/>
+        </p:spPr>
+        <p:txBody>
+          <a:bodyPr vert="horz" rtlCol="0">
+            <a:spAutoFit/>
+          </a:bodyPr>
+          <a:lstStyle/>
+          <a:p>
+            <a:endParaRPr lang="fr-CA"/>
+          </a:p>
+        </p:txBody>
+      </p:sp>
+      <p:sp>
+        <p:nvSpPr>
+          <p:cNvPr id="7" name="ZoneTexte 6">
+            <a:extLst>
+              <a:ext uri="{FF2B5EF4-FFF2-40B4-BE49-F238E27FC236}">
+                <a16:creationId xmlns:a16="http://schemas.microsoft.com/office/drawing/2014/main" id="{47D42A16-CD8F-48F0-A2B3-A504B3E4CB6A}"/>
+              </a:ext>
+            </a:extLst>
+          </p:cNvPr>
+          <p:cNvSpPr txBox="1"/>
+          <p:nvPr>
+            <p:custDataLst>
+              <p:tags r:id="rId6"/>
+            </p:custDataLst>
+          </p:nvPr>
+        </p:nvSpPr>
+        <p:spPr>
+          <a:xfrm>
+            <a:off x="0" y="0"/>
+            <a:ext cx="3810000" cy="1270000"/>
+          </a:xfrm>
+          <a:prstGeom prst="rect">
+            <a:avLst/>
+          </a:prstGeom>
+          <a:noFill/>
+        </p:spPr>
+        <p:txBody>
+          <a:bodyPr vert="horz" rtlCol="0">
+            <a:spAutoFit/>
+          </a:bodyPr>
+          <a:lstStyle/>
+          <a:p>
+            <a:endParaRPr lang="fr-CA"/>
+          </a:p>
+        </p:txBody>
+      </p:sp>
     </p:spTree>
     <p:extLst>
       <p:ext uri="{BB962C8B-B14F-4D97-AF65-F5344CB8AC3E}">
         <p14:creationId xmlns:p14="http://schemas.microsoft.com/office/powerpoint/2010/main" val="2471807738"/>
+      </p:ext>
+    </p:extLst>
+  </p:cSld>
+  <p:clrMapOvr>
+    <a:masterClrMapping/>
+  </p:clrMapOvr>
+</p:sld>
+</file>
+
+<file path=ppt/slides/slide10.xml><?xml version="1.0" encoding="utf-8"?>
+<p:sld xmlns:a="http://schemas.openxmlformats.org/drawingml/2006/main" xmlns:r="http://schemas.openxmlformats.org/officeDocument/2006/relationships" xmlns:p="http://schemas.openxmlformats.org/presentationml/2006/main">
+  <p:cSld>
+    <p:spTree>
+      <p:nvGrpSpPr>
+        <p:cNvPr id="1" name=""/>
+        <p:cNvGrpSpPr/>
+        <p:nvPr/>
+      </p:nvGrpSpPr>
+      <p:grpSpPr>
+        <a:xfrm>
+          <a:off x="0" y="0"/>
+          <a:ext cx="0" cy="0"/>
+          <a:chOff x="0" y="0"/>
+          <a:chExt cx="0" cy="0"/>
+        </a:xfrm>
+      </p:grpSpPr>
+      <p:sp>
+        <p:nvSpPr>
+          <p:cNvPr id="2" name="Titre 1">
+            <a:extLst>
+              <a:ext uri="{FF2B5EF4-FFF2-40B4-BE49-F238E27FC236}">
+                <a16:creationId xmlns:a16="http://schemas.microsoft.com/office/drawing/2014/main" id="{F74F003B-D428-46AB-AEB1-C33F887EAA50}"/>
+              </a:ext>
+            </a:extLst>
+          </p:cNvPr>
+          <p:cNvSpPr>
+            <a:spLocks noGrp="1"/>
+          </p:cNvSpPr>
+          <p:nvPr>
+            <p:ph type="title"/>
+            <p:custDataLst>
+              <p:tags r:id="rId1"/>
+            </p:custDataLst>
+          </p:nvPr>
+        </p:nvSpPr>
+        <p:spPr/>
+        <p:txBody>
+          <a:bodyPr>
+            <a:normAutofit fontScale="90000"/>
+          </a:bodyPr>
+          <a:lstStyle/>
+          <a:p>
+            <a:r>
+              <a:rPr lang="fr-CA" dirty="0"/>
+              <a:t>Utilisation d’un fichier de configuration </a:t>
+            </a:r>
+          </a:p>
+        </p:txBody>
+      </p:sp>
+      <p:sp>
+        <p:nvSpPr>
+          <p:cNvPr id="3" name="Espace réservé du contenu 2">
+            <a:extLst>
+              <a:ext uri="{FF2B5EF4-FFF2-40B4-BE49-F238E27FC236}">
+                <a16:creationId xmlns:a16="http://schemas.microsoft.com/office/drawing/2014/main" id="{B1BCAF1B-8F5E-4962-8C91-6E2F24E5AAF2}"/>
+              </a:ext>
+            </a:extLst>
+          </p:cNvPr>
+          <p:cNvSpPr>
+            <a:spLocks noGrp="1"/>
+          </p:cNvSpPr>
+          <p:nvPr>
+            <p:ph sz="quarter" idx="13"/>
+            <p:custDataLst>
+              <p:tags r:id="rId2"/>
+            </p:custDataLst>
+          </p:nvPr>
+        </p:nvSpPr>
+        <p:spPr/>
+        <p:txBody>
+          <a:bodyPr/>
+          <a:lstStyle/>
+          <a:p>
+            <a:endParaRPr lang="fr-CA" dirty="0"/>
+          </a:p>
+        </p:txBody>
+      </p:sp>
+      <p:pic>
+        <p:nvPicPr>
+          <p:cNvPr id="4" name="Image 3">
+            <a:extLst>
+              <a:ext uri="{FF2B5EF4-FFF2-40B4-BE49-F238E27FC236}">
+                <a16:creationId xmlns:a16="http://schemas.microsoft.com/office/drawing/2014/main" id="{7696D6FF-A750-4055-8EA5-209FC63070CB}"/>
+              </a:ext>
+            </a:extLst>
+          </p:cNvPr>
+          <p:cNvPicPr>
+            <a:picLocks noChangeAspect="1"/>
+          </p:cNvPicPr>
+          <p:nvPr>
+            <p:custDataLst>
+              <p:tags r:id="rId3"/>
+            </p:custDataLst>
+          </p:nvPr>
+        </p:nvPicPr>
+        <p:blipFill>
+          <a:blip r:embed="rId5"/>
+          <a:stretch>
+            <a:fillRect/>
+          </a:stretch>
+        </p:blipFill>
+        <p:spPr>
+          <a:xfrm>
+            <a:off x="4820167" y="2281529"/>
+            <a:ext cx="7059010" cy="4086795"/>
+          </a:xfrm>
+          <a:prstGeom prst="rect">
+            <a:avLst/>
+          </a:prstGeom>
+        </p:spPr>
+      </p:pic>
+    </p:spTree>
+    <p:extLst>
+      <p:ext uri="{BB962C8B-B14F-4D97-AF65-F5344CB8AC3E}">
+        <p14:creationId xmlns:p14="http://schemas.microsoft.com/office/powerpoint/2010/main" val="643500694"/>
+      </p:ext>
+    </p:extLst>
+  </p:cSld>
+  <p:clrMapOvr>
+    <a:masterClrMapping/>
+  </p:clrMapOvr>
+</p:sld>
+</file>
+
+<file path=ppt/slides/slide11.xml><?xml version="1.0" encoding="utf-8"?>
+<p:sld xmlns:a="http://schemas.openxmlformats.org/drawingml/2006/main" xmlns:r="http://schemas.openxmlformats.org/officeDocument/2006/relationships" xmlns:p="http://schemas.openxmlformats.org/presentationml/2006/main">
+  <p:cSld>
+    <p:spTree>
+      <p:nvGrpSpPr>
+        <p:cNvPr id="1" name=""/>
+        <p:cNvGrpSpPr/>
+        <p:nvPr/>
+      </p:nvGrpSpPr>
+      <p:grpSpPr>
+        <a:xfrm>
+          <a:off x="0" y="0"/>
+          <a:ext cx="0" cy="0"/>
+          <a:chOff x="0" y="0"/>
+          <a:chExt cx="0" cy="0"/>
+        </a:xfrm>
+      </p:grpSpPr>
+      <p:sp>
+        <p:nvSpPr>
+          <p:cNvPr id="2" name="Titre 1">
+            <a:extLst>
+              <a:ext uri="{FF2B5EF4-FFF2-40B4-BE49-F238E27FC236}">
+                <a16:creationId xmlns:a16="http://schemas.microsoft.com/office/drawing/2014/main" id="{806E0CFB-F911-4613-8855-9328237D2EE6}"/>
+              </a:ext>
+            </a:extLst>
+          </p:cNvPr>
+          <p:cNvSpPr>
+            <a:spLocks noGrp="1"/>
+          </p:cNvSpPr>
+          <p:nvPr>
+            <p:ph type="title"/>
+            <p:custDataLst>
+              <p:tags r:id="rId1"/>
+            </p:custDataLst>
+          </p:nvPr>
+        </p:nvSpPr>
+        <p:spPr>
+          <a:xfrm>
+            <a:off x="521208" y="1536192"/>
+            <a:ext cx="3640245" cy="640080"/>
+          </a:xfrm>
+        </p:spPr>
+        <p:txBody>
+          <a:bodyPr>
+            <a:normAutofit fontScale="90000"/>
+          </a:bodyPr>
+          <a:lstStyle/>
+          <a:p>
+            <a:r>
+              <a:rPr lang="fr-CA" dirty="0"/>
+              <a:t>Exemple de clé non reconnu :</a:t>
+            </a:r>
+          </a:p>
+        </p:txBody>
+      </p:sp>
+      <p:sp>
+        <p:nvSpPr>
+          <p:cNvPr id="4" name="Espace réservé du contenu 3">
+            <a:extLst>
+              <a:ext uri="{FF2B5EF4-FFF2-40B4-BE49-F238E27FC236}">
+                <a16:creationId xmlns:a16="http://schemas.microsoft.com/office/drawing/2014/main" id="{96BA4AEE-6145-41D6-B599-8B36EBCA14CB}"/>
+              </a:ext>
+            </a:extLst>
+          </p:cNvPr>
+          <p:cNvSpPr>
+            <a:spLocks noGrp="1"/>
+          </p:cNvSpPr>
+          <p:nvPr>
+            <p:ph sz="quarter" idx="13"/>
+            <p:custDataLst>
+              <p:tags r:id="rId2"/>
+            </p:custDataLst>
+          </p:nvPr>
+        </p:nvSpPr>
+        <p:spPr/>
+        <p:txBody>
+          <a:bodyPr/>
+          <a:lstStyle/>
+          <a:p>
+            <a:endParaRPr lang="fr-CA"/>
+          </a:p>
+        </p:txBody>
+      </p:sp>
+      <p:pic>
+        <p:nvPicPr>
+          <p:cNvPr id="6" name="Image 5">
+            <a:extLst>
+              <a:ext uri="{FF2B5EF4-FFF2-40B4-BE49-F238E27FC236}">
+                <a16:creationId xmlns:a16="http://schemas.microsoft.com/office/drawing/2014/main" id="{E8726B0E-7C19-4971-BB67-8F46AD6A5AE6}"/>
+              </a:ext>
+            </a:extLst>
+          </p:cNvPr>
+          <p:cNvPicPr>
+            <a:picLocks noChangeAspect="1"/>
+          </p:cNvPicPr>
+          <p:nvPr>
+            <p:custDataLst>
+              <p:tags r:id="rId3"/>
+            </p:custDataLst>
+          </p:nvPr>
+        </p:nvPicPr>
+        <p:blipFill>
+          <a:blip r:embed="rId6"/>
+          <a:stretch>
+            <a:fillRect/>
+          </a:stretch>
+        </p:blipFill>
+        <p:spPr>
+          <a:xfrm>
+            <a:off x="4109419" y="320039"/>
+            <a:ext cx="7814738" cy="6320906"/>
+          </a:xfrm>
+          <a:prstGeom prst="rect">
+            <a:avLst/>
+          </a:prstGeom>
+        </p:spPr>
+      </p:pic>
+    </p:spTree>
+    <p:extLst>
+      <p:ext uri="{BB962C8B-B14F-4D97-AF65-F5344CB8AC3E}">
+        <p14:creationId xmlns:p14="http://schemas.microsoft.com/office/powerpoint/2010/main" val="3228696591"/>
+      </p:ext>
+    </p:extLst>
+  </p:cSld>
+  <p:clrMapOvr>
+    <a:masterClrMapping/>
+  </p:clrMapOvr>
+</p:sld>
+</file>
+
+<file path=ppt/slides/slide12.xml><?xml version="1.0" encoding="utf-8"?>
+<p:sld xmlns:a="http://schemas.openxmlformats.org/drawingml/2006/main" xmlns:r="http://schemas.openxmlformats.org/officeDocument/2006/relationships" xmlns:p="http://schemas.openxmlformats.org/presentationml/2006/main">
+  <p:cSld>
+    <p:spTree>
+      <p:nvGrpSpPr>
+        <p:cNvPr id="1" name=""/>
+        <p:cNvGrpSpPr/>
+        <p:nvPr/>
+      </p:nvGrpSpPr>
+      <p:grpSpPr>
+        <a:xfrm>
+          <a:off x="0" y="0"/>
+          <a:ext cx="0" cy="0"/>
+          <a:chOff x="0" y="0"/>
+          <a:chExt cx="0" cy="0"/>
+        </a:xfrm>
+      </p:grpSpPr>
+      <p:sp>
+        <p:nvSpPr>
+          <p:cNvPr id="2" name="Titre 1">
+            <a:extLst>
+              <a:ext uri="{FF2B5EF4-FFF2-40B4-BE49-F238E27FC236}">
+                <a16:creationId xmlns:a16="http://schemas.microsoft.com/office/drawing/2014/main" id="{9C6E44C4-EABC-4E03-ADD9-57A94F664AD8}"/>
+              </a:ext>
+            </a:extLst>
+          </p:cNvPr>
+          <p:cNvSpPr>
+            <a:spLocks noGrp="1"/>
+          </p:cNvSpPr>
+          <p:nvPr>
+            <p:ph type="title"/>
+            <p:custDataLst>
+              <p:tags r:id="rId1"/>
+            </p:custDataLst>
+          </p:nvPr>
+        </p:nvSpPr>
+        <p:spPr/>
+        <p:txBody>
+          <a:bodyPr/>
+          <a:lstStyle/>
+          <a:p>
+            <a:r>
+              <a:rPr lang="fr-CA" dirty="0"/>
+              <a:t>Commande utiles : </a:t>
+            </a:r>
+          </a:p>
+        </p:txBody>
+      </p:sp>
+      <p:sp>
+        <p:nvSpPr>
+          <p:cNvPr id="3" name="Espace réservé du contenu 2">
+            <a:extLst>
+              <a:ext uri="{FF2B5EF4-FFF2-40B4-BE49-F238E27FC236}">
+                <a16:creationId xmlns:a16="http://schemas.microsoft.com/office/drawing/2014/main" id="{481E7386-96A9-4091-9C2F-C027BD6CBFFE}"/>
+              </a:ext>
+            </a:extLst>
+          </p:cNvPr>
+          <p:cNvSpPr>
+            <a:spLocks noGrp="1"/>
+          </p:cNvSpPr>
+          <p:nvPr>
+            <p:ph sz="quarter" idx="13"/>
+            <p:custDataLst>
+              <p:tags r:id="rId2"/>
+            </p:custDataLst>
+          </p:nvPr>
+        </p:nvSpPr>
+        <p:spPr>
+          <a:xfrm>
+            <a:off x="539496" y="2560320"/>
+            <a:ext cx="3801595" cy="3977640"/>
+          </a:xfrm>
+        </p:spPr>
+        <p:txBody>
+          <a:bodyPr/>
+          <a:lstStyle/>
+          <a:p>
+            <a:r>
+              <a:rPr lang="fr-CA" sz="1400" b="1" dirty="0"/>
+              <a:t>$</a:t>
+            </a:r>
+            <a:r>
+              <a:rPr lang="fr-CA" sz="1400" b="1" dirty="0" err="1"/>
+              <a:t>sudo</a:t>
+            </a:r>
+            <a:r>
+              <a:rPr lang="fr-CA" sz="1400" b="1" dirty="0"/>
+              <a:t> </a:t>
+            </a:r>
+            <a:r>
+              <a:rPr lang="fr-CA" sz="1400" b="1" dirty="0" err="1"/>
+              <a:t>journalctl</a:t>
+            </a:r>
+            <a:r>
+              <a:rPr lang="fr-CA" sz="1400" b="1" dirty="0"/>
+              <a:t> –t </a:t>
+            </a:r>
+            <a:r>
+              <a:rPr lang="fr-CA" sz="1400" b="1" dirty="0" err="1"/>
+              <a:t>sshd</a:t>
+            </a:r>
+            <a:endParaRPr lang="fr-CA" sz="1400" b="1" dirty="0"/>
+          </a:p>
+          <a:p>
+            <a:endParaRPr lang="fr-CA" dirty="0"/>
+          </a:p>
+          <a:p>
+            <a:endParaRPr lang="fr-CA" dirty="0"/>
+          </a:p>
+        </p:txBody>
+      </p:sp>
+      <p:pic>
+        <p:nvPicPr>
+          <p:cNvPr id="5" name="Image 4">
+            <a:extLst>
+              <a:ext uri="{FF2B5EF4-FFF2-40B4-BE49-F238E27FC236}">
+                <a16:creationId xmlns:a16="http://schemas.microsoft.com/office/drawing/2014/main" id="{0D12C34D-CF3C-4B48-8226-5CC63BF05AC2}"/>
+              </a:ext>
+            </a:extLst>
+          </p:cNvPr>
+          <p:cNvPicPr>
+            <a:picLocks noChangeAspect="1"/>
+          </p:cNvPicPr>
+          <p:nvPr>
+            <p:custDataLst>
+              <p:tags r:id="rId3"/>
+            </p:custDataLst>
+          </p:nvPr>
+        </p:nvPicPr>
+        <p:blipFill>
+          <a:blip r:embed="rId5"/>
+          <a:stretch>
+            <a:fillRect/>
+          </a:stretch>
+        </p:blipFill>
+        <p:spPr>
+          <a:xfrm>
+            <a:off x="4193310" y="1536192"/>
+            <a:ext cx="7816058" cy="4763165"/>
+          </a:xfrm>
+          <a:prstGeom prst="rect">
+            <a:avLst/>
+          </a:prstGeom>
+        </p:spPr>
+      </p:pic>
+    </p:spTree>
+    <p:extLst>
+      <p:ext uri="{BB962C8B-B14F-4D97-AF65-F5344CB8AC3E}">
+        <p14:creationId xmlns:p14="http://schemas.microsoft.com/office/powerpoint/2010/main" val="334105744"/>
+      </p:ext>
+    </p:extLst>
+  </p:cSld>
+  <p:clrMapOvr>
+    <a:masterClrMapping/>
+  </p:clrMapOvr>
+</p:sld>
+</file>
+
+<file path=ppt/slides/slide13.xml><?xml version="1.0" encoding="utf-8"?>
+<p:sld xmlns:a="http://schemas.openxmlformats.org/drawingml/2006/main" xmlns:r="http://schemas.openxmlformats.org/officeDocument/2006/relationships" xmlns:p="http://schemas.openxmlformats.org/presentationml/2006/main">
+  <p:cSld>
+    <p:spTree>
+      <p:nvGrpSpPr>
+        <p:cNvPr id="1" name=""/>
+        <p:cNvGrpSpPr/>
+        <p:nvPr/>
+      </p:nvGrpSpPr>
+      <p:grpSpPr>
+        <a:xfrm>
+          <a:off x="0" y="0"/>
+          <a:ext cx="0" cy="0"/>
+          <a:chOff x="0" y="0"/>
+          <a:chExt cx="0" cy="0"/>
+        </a:xfrm>
+      </p:grpSpPr>
+      <p:sp>
+        <p:nvSpPr>
+          <p:cNvPr id="2" name="Titre 1">
+            <a:extLst>
+              <a:ext uri="{FF2B5EF4-FFF2-40B4-BE49-F238E27FC236}">
+                <a16:creationId xmlns:a16="http://schemas.microsoft.com/office/drawing/2014/main" id="{9C6E44C4-EABC-4E03-ADD9-57A94F664AD8}"/>
+              </a:ext>
+            </a:extLst>
+          </p:cNvPr>
+          <p:cNvSpPr>
+            <a:spLocks noGrp="1"/>
+          </p:cNvSpPr>
+          <p:nvPr>
+            <p:ph type="title"/>
+            <p:custDataLst>
+              <p:tags r:id="rId1"/>
+            </p:custDataLst>
+          </p:nvPr>
+        </p:nvSpPr>
+        <p:spPr/>
+        <p:txBody>
+          <a:bodyPr/>
+          <a:lstStyle/>
+          <a:p>
+            <a:r>
+              <a:rPr lang="fr-CA" dirty="0"/>
+              <a:t>Commande utiles : </a:t>
+            </a:r>
+          </a:p>
+        </p:txBody>
+      </p:sp>
+      <p:sp>
+        <p:nvSpPr>
+          <p:cNvPr id="3" name="Espace réservé du contenu 2">
+            <a:extLst>
+              <a:ext uri="{FF2B5EF4-FFF2-40B4-BE49-F238E27FC236}">
+                <a16:creationId xmlns:a16="http://schemas.microsoft.com/office/drawing/2014/main" id="{481E7386-96A9-4091-9C2F-C027BD6CBFFE}"/>
+              </a:ext>
+            </a:extLst>
+          </p:cNvPr>
+          <p:cNvSpPr>
+            <a:spLocks noGrp="1"/>
+          </p:cNvSpPr>
+          <p:nvPr>
+            <p:ph sz="quarter" idx="13"/>
+            <p:custDataLst>
+              <p:tags r:id="rId2"/>
+            </p:custDataLst>
+          </p:nvPr>
+        </p:nvSpPr>
+        <p:spPr>
+          <a:xfrm>
+            <a:off x="539496" y="2560320"/>
+            <a:ext cx="3801595" cy="3977640"/>
+          </a:xfrm>
+        </p:spPr>
+        <p:txBody>
+          <a:bodyPr/>
+          <a:lstStyle/>
+          <a:p>
+            <a:r>
+              <a:rPr lang="fr-CA" sz="1400" b="1" dirty="0"/>
+              <a:t>$</a:t>
+            </a:r>
+            <a:r>
+              <a:rPr lang="fr-CA" sz="1400" b="1" dirty="0" err="1"/>
+              <a:t>tail</a:t>
+            </a:r>
+            <a:r>
+              <a:rPr lang="fr-CA" sz="1400" b="1" dirty="0"/>
+              <a:t> –f –n 500 /var/log/auth.log | </a:t>
+            </a:r>
+            <a:r>
+              <a:rPr lang="fr-CA" sz="1400" b="1" dirty="0" err="1"/>
+              <a:t>grep</a:t>
+            </a:r>
+            <a:r>
+              <a:rPr lang="fr-CA" sz="1400" b="1" dirty="0"/>
+              <a:t> </a:t>
+            </a:r>
+            <a:r>
+              <a:rPr lang="fr-CA" sz="1400" b="1" dirty="0" err="1"/>
+              <a:t>sshd</a:t>
+            </a:r>
+            <a:endParaRPr lang="fr-CA" sz="1400" b="1" dirty="0"/>
+          </a:p>
+          <a:p>
+            <a:endParaRPr lang="fr-CA" dirty="0"/>
+          </a:p>
+          <a:p>
+            <a:endParaRPr lang="fr-CA" dirty="0"/>
+          </a:p>
+        </p:txBody>
+      </p:sp>
+      <p:pic>
+        <p:nvPicPr>
+          <p:cNvPr id="4" name="Image 3">
+            <a:extLst>
+              <a:ext uri="{FF2B5EF4-FFF2-40B4-BE49-F238E27FC236}">
+                <a16:creationId xmlns:a16="http://schemas.microsoft.com/office/drawing/2014/main" id="{6795CC2F-194F-41B0-BC70-5A4D1172BE2F}"/>
+              </a:ext>
+            </a:extLst>
+          </p:cNvPr>
+          <p:cNvPicPr>
+            <a:picLocks noChangeAspect="1"/>
+          </p:cNvPicPr>
+          <p:nvPr>
+            <p:custDataLst>
+              <p:tags r:id="rId3"/>
+            </p:custDataLst>
+          </p:nvPr>
+        </p:nvPicPr>
+        <p:blipFill>
+          <a:blip r:embed="rId5"/>
+          <a:stretch>
+            <a:fillRect/>
+          </a:stretch>
+        </p:blipFill>
+        <p:spPr>
+          <a:xfrm>
+            <a:off x="998296" y="3403600"/>
+            <a:ext cx="9659698" cy="2257740"/>
+          </a:xfrm>
+          <a:prstGeom prst="rect">
+            <a:avLst/>
+          </a:prstGeom>
+        </p:spPr>
+      </p:pic>
+    </p:spTree>
+    <p:extLst>
+      <p:ext uri="{BB962C8B-B14F-4D97-AF65-F5344CB8AC3E}">
+        <p14:creationId xmlns:p14="http://schemas.microsoft.com/office/powerpoint/2010/main" val="282074698"/>
+      </p:ext>
+    </p:extLst>
+  </p:cSld>
+  <p:clrMapOvr>
+    <a:masterClrMapping/>
+  </p:clrMapOvr>
+</p:sld>
+</file>
+
+<file path=ppt/slides/slide14.xml><?xml version="1.0" encoding="utf-8"?>
+<p:sld xmlns:a="http://schemas.openxmlformats.org/drawingml/2006/main" xmlns:r="http://schemas.openxmlformats.org/officeDocument/2006/relationships" xmlns:p="http://schemas.openxmlformats.org/presentationml/2006/main">
+  <p:cSld>
+    <p:spTree>
+      <p:nvGrpSpPr>
+        <p:cNvPr id="1" name=""/>
+        <p:cNvGrpSpPr/>
+        <p:nvPr/>
+      </p:nvGrpSpPr>
+      <p:grpSpPr>
+        <a:xfrm>
+          <a:off x="0" y="0"/>
+          <a:ext cx="0" cy="0"/>
+          <a:chOff x="0" y="0"/>
+          <a:chExt cx="0" cy="0"/>
+        </a:xfrm>
+      </p:grpSpPr>
+      <p:sp>
+        <p:nvSpPr>
+          <p:cNvPr id="2" name="Titre 1">
+            <a:extLst>
+              <a:ext uri="{FF2B5EF4-FFF2-40B4-BE49-F238E27FC236}">
+                <a16:creationId xmlns:a16="http://schemas.microsoft.com/office/drawing/2014/main" id="{E7EDF541-4B29-442E-8F5F-F791C223A885}"/>
+              </a:ext>
+            </a:extLst>
+          </p:cNvPr>
+          <p:cNvSpPr>
+            <a:spLocks noGrp="1"/>
+          </p:cNvSpPr>
+          <p:nvPr>
+            <p:ph type="title"/>
+            <p:custDataLst>
+              <p:tags r:id="rId1"/>
+            </p:custDataLst>
+          </p:nvPr>
+        </p:nvSpPr>
+        <p:spPr>
+          <a:xfrm>
+            <a:off x="521208" y="526473"/>
+            <a:ext cx="4660392" cy="1649799"/>
+          </a:xfrm>
+        </p:spPr>
+        <p:txBody>
+          <a:bodyPr>
+            <a:normAutofit/>
+          </a:bodyPr>
+          <a:lstStyle/>
+          <a:p>
+            <a:r>
+              <a:rPr lang="fr-CA" dirty="0"/>
+              <a:t>Modification de la </a:t>
+            </a:r>
+            <a:br>
+              <a:rPr lang="fr-CA" dirty="0"/>
+            </a:br>
+            <a:r>
+              <a:rPr lang="fr-CA" dirty="0"/>
+              <a:t>configuration </a:t>
+            </a:r>
+            <a:r>
+              <a:rPr lang="fr-CA" dirty="0" err="1"/>
+              <a:t>sshd</a:t>
+            </a:r>
+            <a:endParaRPr lang="fr-CA" dirty="0"/>
+          </a:p>
+        </p:txBody>
+      </p:sp>
+      <p:pic>
+        <p:nvPicPr>
+          <p:cNvPr id="5" name="Image 4" descr="Une image contenant texte&#10;&#10;Description générée automatiquement">
+            <a:extLst>
+              <a:ext uri="{FF2B5EF4-FFF2-40B4-BE49-F238E27FC236}">
+                <a16:creationId xmlns:a16="http://schemas.microsoft.com/office/drawing/2014/main" id="{1CDA411E-C155-4617-8865-B9445210561D}"/>
+              </a:ext>
+            </a:extLst>
+          </p:cNvPr>
+          <p:cNvPicPr>
+            <a:picLocks noChangeAspect="1"/>
+          </p:cNvPicPr>
+          <p:nvPr>
+            <p:custDataLst>
+              <p:tags r:id="rId2"/>
+            </p:custDataLst>
+          </p:nvPr>
+        </p:nvPicPr>
+        <p:blipFill>
+          <a:blip r:embed="rId8">
+            <a:extLst>
+              <a:ext uri="{28A0092B-C50C-407E-A947-70E740481C1C}">
+                <a14:useLocalDpi xmlns:a14="http://schemas.microsoft.com/office/drawing/2010/main" val="0"/>
+              </a:ext>
+            </a:extLst>
+          </a:blip>
+          <a:stretch>
+            <a:fillRect/>
+          </a:stretch>
+        </p:blipFill>
+        <p:spPr>
+          <a:xfrm>
+            <a:off x="354778" y="2346397"/>
+            <a:ext cx="5048495" cy="4448796"/>
+          </a:xfrm>
+          <a:prstGeom prst="rect">
+            <a:avLst/>
+          </a:prstGeom>
+        </p:spPr>
+      </p:pic>
+      <p:pic>
+        <p:nvPicPr>
+          <p:cNvPr id="6" name="Image 5">
+            <a:extLst>
+              <a:ext uri="{FF2B5EF4-FFF2-40B4-BE49-F238E27FC236}">
+                <a16:creationId xmlns:a16="http://schemas.microsoft.com/office/drawing/2014/main" id="{2D13018D-048D-4573-A68E-083A257C47CF}"/>
+              </a:ext>
+            </a:extLst>
+          </p:cNvPr>
+          <p:cNvPicPr>
+            <a:picLocks noChangeAspect="1"/>
+          </p:cNvPicPr>
+          <p:nvPr>
+            <p:custDataLst>
+              <p:tags r:id="rId3"/>
+            </p:custDataLst>
+          </p:nvPr>
+        </p:nvPicPr>
+        <p:blipFill>
+          <a:blip r:embed="rId9"/>
+          <a:stretch>
+            <a:fillRect/>
+          </a:stretch>
+        </p:blipFill>
+        <p:spPr>
+          <a:xfrm>
+            <a:off x="6096000" y="175491"/>
+            <a:ext cx="5932714" cy="6858000"/>
+          </a:xfrm>
+          <a:prstGeom prst="rect">
+            <a:avLst/>
+          </a:prstGeom>
+        </p:spPr>
+      </p:pic>
+      <p:cxnSp>
+        <p:nvCxnSpPr>
+          <p:cNvPr id="8" name="Connecteur droit avec flèche 7">
+            <a:extLst>
+              <a:ext uri="{FF2B5EF4-FFF2-40B4-BE49-F238E27FC236}">
+                <a16:creationId xmlns:a16="http://schemas.microsoft.com/office/drawing/2014/main" id="{A824C00A-B2E1-45C5-B087-AD218F522015}"/>
+              </a:ext>
+            </a:extLst>
+          </p:cNvPr>
+          <p:cNvCxnSpPr>
+            <a:cxnSpLocks/>
+          </p:cNvCxnSpPr>
+          <p:nvPr>
+            <p:custDataLst>
+              <p:tags r:id="rId4"/>
+            </p:custDataLst>
+          </p:nvPr>
+        </p:nvCxnSpPr>
+        <p:spPr>
+          <a:xfrm flipV="1">
+            <a:off x="4535055" y="4922983"/>
+            <a:ext cx="1560945" cy="1062181"/>
+          </a:xfrm>
+          <a:prstGeom prst="straightConnector1">
+            <a:avLst/>
+          </a:prstGeom>
+          <a:ln>
+            <a:tailEnd type="triangle"/>
+          </a:ln>
+        </p:spPr>
+        <p:style>
+          <a:lnRef idx="1">
+            <a:schemeClr val="accent2"/>
+          </a:lnRef>
+          <a:fillRef idx="0">
+            <a:schemeClr val="accent2"/>
+          </a:fillRef>
+          <a:effectRef idx="0">
+            <a:schemeClr val="accent2"/>
+          </a:effectRef>
+          <a:fontRef idx="minor">
+            <a:schemeClr val="tx1"/>
+          </a:fontRef>
+        </p:style>
+      </p:cxnSp>
+      <p:sp>
+        <p:nvSpPr>
+          <p:cNvPr id="13" name="Flèche : gauche 12">
+            <a:extLst>
+              <a:ext uri="{FF2B5EF4-FFF2-40B4-BE49-F238E27FC236}">
+                <a16:creationId xmlns:a16="http://schemas.microsoft.com/office/drawing/2014/main" id="{BC27F137-0663-4E8D-B491-085AC5FD7AC4}"/>
+              </a:ext>
+            </a:extLst>
+          </p:cNvPr>
+          <p:cNvSpPr/>
+          <p:nvPr>
+            <p:custDataLst>
+              <p:tags r:id="rId5"/>
+            </p:custDataLst>
+          </p:nvPr>
+        </p:nvSpPr>
+        <p:spPr>
+          <a:xfrm>
+            <a:off x="6936509" y="2613891"/>
+            <a:ext cx="1209964" cy="175491"/>
+          </a:xfrm>
+          <a:prstGeom prst="leftArrow">
+            <a:avLst/>
+          </a:prstGeom>
+        </p:spPr>
+        <p:style>
+          <a:lnRef idx="2">
+            <a:schemeClr val="accent2">
+              <a:shade val="50000"/>
+            </a:schemeClr>
+          </a:lnRef>
+          <a:fillRef idx="1">
+            <a:schemeClr val="accent2"/>
+          </a:fillRef>
+          <a:effectRef idx="0">
+            <a:schemeClr val="accent2"/>
+          </a:effectRef>
+          <a:fontRef idx="minor">
+            <a:schemeClr val="lt1"/>
+          </a:fontRef>
+        </p:style>
+        <p:txBody>
+          <a:bodyPr rtlCol="0" anchor="ctr"/>
+          <a:lstStyle/>
+          <a:p>
+            <a:pPr algn="ctr"/>
+            <a:endParaRPr lang="fr-CA"/>
+          </a:p>
+        </p:txBody>
+      </p:sp>
+      <p:sp>
+        <p:nvSpPr>
+          <p:cNvPr id="14" name="Flèche : gauche 13">
+            <a:extLst>
+              <a:ext uri="{FF2B5EF4-FFF2-40B4-BE49-F238E27FC236}">
+                <a16:creationId xmlns:a16="http://schemas.microsoft.com/office/drawing/2014/main" id="{1399D7D2-2A39-4E67-8990-E10BC771279B}"/>
+              </a:ext>
+            </a:extLst>
+          </p:cNvPr>
+          <p:cNvSpPr/>
+          <p:nvPr>
+            <p:custDataLst>
+              <p:tags r:id="rId6"/>
+            </p:custDataLst>
+          </p:nvPr>
+        </p:nvSpPr>
+        <p:spPr>
+          <a:xfrm>
+            <a:off x="8834582" y="5454073"/>
+            <a:ext cx="1209964" cy="175491"/>
+          </a:xfrm>
+          <a:prstGeom prst="leftArrow">
+            <a:avLst/>
+          </a:prstGeom>
+        </p:spPr>
+        <p:style>
+          <a:lnRef idx="2">
+            <a:schemeClr val="accent2">
+              <a:shade val="50000"/>
+            </a:schemeClr>
+          </a:lnRef>
+          <a:fillRef idx="1">
+            <a:schemeClr val="accent2"/>
+          </a:fillRef>
+          <a:effectRef idx="0">
+            <a:schemeClr val="accent2"/>
+          </a:effectRef>
+          <a:fontRef idx="minor">
+            <a:schemeClr val="lt1"/>
+          </a:fontRef>
+        </p:style>
+        <p:txBody>
+          <a:bodyPr rtlCol="0" anchor="ctr"/>
+          <a:lstStyle/>
+          <a:p>
+            <a:pPr algn="ctr"/>
+            <a:endParaRPr lang="fr-CA"/>
+          </a:p>
+        </p:txBody>
+      </p:sp>
+    </p:spTree>
+    <p:extLst>
+      <p:ext uri="{BB962C8B-B14F-4D97-AF65-F5344CB8AC3E}">
+        <p14:creationId xmlns:p14="http://schemas.microsoft.com/office/powerpoint/2010/main" val="1371179424"/>
+      </p:ext>
+    </p:extLst>
+  </p:cSld>
+  <p:clrMapOvr>
+    <a:masterClrMapping/>
+  </p:clrMapOvr>
+</p:sld>
+</file>
+
+<file path=ppt/slides/slide15.xml><?xml version="1.0" encoding="utf-8"?>
+<p:sld xmlns:a="http://schemas.openxmlformats.org/drawingml/2006/main" xmlns:r="http://schemas.openxmlformats.org/officeDocument/2006/relationships" xmlns:p="http://schemas.openxmlformats.org/presentationml/2006/main">
+  <p:cSld>
+    <p:spTree>
+      <p:nvGrpSpPr>
+        <p:cNvPr id="1" name=""/>
+        <p:cNvGrpSpPr/>
+        <p:nvPr/>
+      </p:nvGrpSpPr>
+      <p:grpSpPr>
+        <a:xfrm>
+          <a:off x="0" y="0"/>
+          <a:ext cx="0" cy="0"/>
+          <a:chOff x="0" y="0"/>
+          <a:chExt cx="0" cy="0"/>
+        </a:xfrm>
+      </p:grpSpPr>
+      <p:sp>
+        <p:nvSpPr>
+          <p:cNvPr id="2" name="Titre 1">
+            <a:extLst>
+              <a:ext uri="{FF2B5EF4-FFF2-40B4-BE49-F238E27FC236}">
+                <a16:creationId xmlns:a16="http://schemas.microsoft.com/office/drawing/2014/main" id="{38311C69-DB19-499C-AD40-45A7632B173B}"/>
+              </a:ext>
+            </a:extLst>
+          </p:cNvPr>
+          <p:cNvSpPr>
+            <a:spLocks noGrp="1"/>
+          </p:cNvSpPr>
+          <p:nvPr>
+            <p:ph type="title"/>
+            <p:custDataLst>
+              <p:tags r:id="rId1"/>
+            </p:custDataLst>
+          </p:nvPr>
+        </p:nvSpPr>
+        <p:spPr/>
+        <p:txBody>
+          <a:bodyPr/>
+          <a:lstStyle/>
+          <a:p>
+            <a:endParaRPr lang="fr-CA" dirty="0"/>
+          </a:p>
+        </p:txBody>
+      </p:sp>
+      <p:sp>
+        <p:nvSpPr>
+          <p:cNvPr id="3" name="Espace réservé du contenu 2">
+            <a:extLst>
+              <a:ext uri="{FF2B5EF4-FFF2-40B4-BE49-F238E27FC236}">
+                <a16:creationId xmlns:a16="http://schemas.microsoft.com/office/drawing/2014/main" id="{521E7954-81A9-4954-AADE-822298B968A2}"/>
+              </a:ext>
+            </a:extLst>
+          </p:cNvPr>
+          <p:cNvSpPr>
+            <a:spLocks noGrp="1"/>
+          </p:cNvSpPr>
+          <p:nvPr>
+            <p:ph sz="quarter" idx="13"/>
+            <p:custDataLst>
+              <p:tags r:id="rId2"/>
+            </p:custDataLst>
+          </p:nvPr>
+        </p:nvSpPr>
+        <p:spPr/>
+        <p:txBody>
+          <a:bodyPr/>
+          <a:lstStyle/>
+          <a:p>
+            <a:endParaRPr lang="fr-CA" dirty="0"/>
+          </a:p>
+        </p:txBody>
+      </p:sp>
+      <p:pic>
+        <p:nvPicPr>
+          <p:cNvPr id="4" name="Image 3">
+            <a:extLst>
+              <a:ext uri="{FF2B5EF4-FFF2-40B4-BE49-F238E27FC236}">
+                <a16:creationId xmlns:a16="http://schemas.microsoft.com/office/drawing/2014/main" id="{A70E77EC-91DB-46E4-A39D-B9524752913F}"/>
+              </a:ext>
+            </a:extLst>
+          </p:cNvPr>
+          <p:cNvPicPr>
+            <a:picLocks noChangeAspect="1"/>
+          </p:cNvPicPr>
+          <p:nvPr>
+            <p:custDataLst>
+              <p:tags r:id="rId3"/>
+            </p:custDataLst>
+          </p:nvPr>
+        </p:nvPicPr>
+        <p:blipFill>
+          <a:blip r:embed="rId10"/>
+          <a:stretch>
+            <a:fillRect/>
+          </a:stretch>
+        </p:blipFill>
+        <p:spPr>
+          <a:xfrm>
+            <a:off x="150090" y="80495"/>
+            <a:ext cx="6059528" cy="6523505"/>
+          </a:xfrm>
+          <a:prstGeom prst="rect">
+            <a:avLst/>
+          </a:prstGeom>
+        </p:spPr>
+      </p:pic>
+      <p:pic>
+        <p:nvPicPr>
+          <p:cNvPr id="5" name="Image 4">
+            <a:extLst>
+              <a:ext uri="{FF2B5EF4-FFF2-40B4-BE49-F238E27FC236}">
+                <a16:creationId xmlns:a16="http://schemas.microsoft.com/office/drawing/2014/main" id="{55F7A84D-8AF3-4D3F-967A-166A74124E2B}"/>
+              </a:ext>
+            </a:extLst>
+          </p:cNvPr>
+          <p:cNvPicPr>
+            <a:picLocks noChangeAspect="1"/>
+          </p:cNvPicPr>
+          <p:nvPr>
+            <p:custDataLst>
+              <p:tags r:id="rId4"/>
+            </p:custDataLst>
+          </p:nvPr>
+        </p:nvPicPr>
+        <p:blipFill>
+          <a:blip r:embed="rId11"/>
+          <a:stretch>
+            <a:fillRect/>
+          </a:stretch>
+        </p:blipFill>
+        <p:spPr>
+          <a:xfrm>
+            <a:off x="6209618" y="80495"/>
+            <a:ext cx="5985087" cy="6471826"/>
+          </a:xfrm>
+          <a:prstGeom prst="rect">
+            <a:avLst/>
+          </a:prstGeom>
+        </p:spPr>
+      </p:pic>
+      <p:sp>
+        <p:nvSpPr>
+          <p:cNvPr id="6" name="Flèche : gauche 5">
+            <a:extLst>
+              <a:ext uri="{FF2B5EF4-FFF2-40B4-BE49-F238E27FC236}">
+                <a16:creationId xmlns:a16="http://schemas.microsoft.com/office/drawing/2014/main" id="{7D56AB75-9031-44FD-AE57-2CDA7A2ACD4A}"/>
+              </a:ext>
+            </a:extLst>
+          </p:cNvPr>
+          <p:cNvSpPr/>
+          <p:nvPr>
+            <p:custDataLst>
+              <p:tags r:id="rId5"/>
+            </p:custDataLst>
+          </p:nvPr>
+        </p:nvSpPr>
+        <p:spPr>
+          <a:xfrm>
+            <a:off x="7869380" y="1401433"/>
+            <a:ext cx="2355273" cy="251876"/>
+          </a:xfrm>
+          <a:prstGeom prst="leftArrow">
+            <a:avLst/>
+          </a:prstGeom>
+        </p:spPr>
+        <p:style>
+          <a:lnRef idx="2">
+            <a:schemeClr val="accent2">
+              <a:shade val="50000"/>
+            </a:schemeClr>
+          </a:lnRef>
+          <a:fillRef idx="1">
+            <a:schemeClr val="accent2"/>
+          </a:fillRef>
+          <a:effectRef idx="0">
+            <a:schemeClr val="accent2"/>
+          </a:effectRef>
+          <a:fontRef idx="minor">
+            <a:schemeClr val="lt1"/>
+          </a:fontRef>
+        </p:style>
+        <p:txBody>
+          <a:bodyPr rtlCol="0" anchor="ctr"/>
+          <a:lstStyle/>
+          <a:p>
+            <a:pPr algn="ctr"/>
+            <a:r>
+              <a:rPr lang="fr-CA" dirty="0"/>
+              <a:t>no</a:t>
+            </a:r>
+          </a:p>
+        </p:txBody>
+      </p:sp>
+      <p:sp>
+        <p:nvSpPr>
+          <p:cNvPr id="7" name="Flèche : gauche 6">
+            <a:extLst>
+              <a:ext uri="{FF2B5EF4-FFF2-40B4-BE49-F238E27FC236}">
+                <a16:creationId xmlns:a16="http://schemas.microsoft.com/office/drawing/2014/main" id="{B9BB7395-9588-4D50-A8DB-0D5A4778BB1C}"/>
+              </a:ext>
+            </a:extLst>
+          </p:cNvPr>
+          <p:cNvSpPr/>
+          <p:nvPr>
+            <p:custDataLst>
+              <p:tags r:id="rId6"/>
+            </p:custDataLst>
+          </p:nvPr>
+        </p:nvSpPr>
+        <p:spPr>
+          <a:xfrm>
+            <a:off x="8132616" y="2722371"/>
+            <a:ext cx="2355273" cy="251876"/>
+          </a:xfrm>
+          <a:prstGeom prst="leftArrow">
+            <a:avLst/>
+          </a:prstGeom>
+        </p:spPr>
+        <p:style>
+          <a:lnRef idx="2">
+            <a:schemeClr val="accent2">
+              <a:shade val="50000"/>
+            </a:schemeClr>
+          </a:lnRef>
+          <a:fillRef idx="1">
+            <a:schemeClr val="accent2"/>
+          </a:fillRef>
+          <a:effectRef idx="0">
+            <a:schemeClr val="accent2"/>
+          </a:effectRef>
+          <a:fontRef idx="minor">
+            <a:schemeClr val="lt1"/>
+          </a:fontRef>
+        </p:style>
+        <p:txBody>
+          <a:bodyPr rtlCol="0" anchor="ctr"/>
+          <a:lstStyle/>
+          <a:p>
+            <a:pPr algn="ctr"/>
+            <a:r>
+              <a:rPr lang="fr-CA" dirty="0"/>
+              <a:t>300</a:t>
+            </a:r>
+          </a:p>
+        </p:txBody>
+      </p:sp>
+      <p:sp>
+        <p:nvSpPr>
+          <p:cNvPr id="8" name="Flèche : gauche 7">
+            <a:extLst>
+              <a:ext uri="{FF2B5EF4-FFF2-40B4-BE49-F238E27FC236}">
+                <a16:creationId xmlns:a16="http://schemas.microsoft.com/office/drawing/2014/main" id="{A52E06A9-4D02-4492-943C-F8C3C4114ADF}"/>
+              </a:ext>
+            </a:extLst>
+          </p:cNvPr>
+          <p:cNvSpPr/>
+          <p:nvPr>
+            <p:custDataLst>
+              <p:tags r:id="rId7"/>
+            </p:custDataLst>
+          </p:nvPr>
+        </p:nvSpPr>
+        <p:spPr>
+          <a:xfrm>
+            <a:off x="8455889" y="6200347"/>
+            <a:ext cx="2355273" cy="251876"/>
+          </a:xfrm>
+          <a:prstGeom prst="leftArrow">
+            <a:avLst/>
+          </a:prstGeom>
+        </p:spPr>
+        <p:style>
+          <a:lnRef idx="2">
+            <a:schemeClr val="accent2">
+              <a:shade val="50000"/>
+            </a:schemeClr>
+          </a:lnRef>
+          <a:fillRef idx="1">
+            <a:schemeClr val="accent2"/>
+          </a:fillRef>
+          <a:effectRef idx="0">
+            <a:schemeClr val="accent2"/>
+          </a:effectRef>
+          <a:fontRef idx="minor">
+            <a:schemeClr val="lt1"/>
+          </a:fontRef>
+        </p:style>
+        <p:txBody>
+          <a:bodyPr rtlCol="0" anchor="ctr"/>
+          <a:lstStyle/>
+          <a:p>
+            <a:pPr algn="ctr"/>
+            <a:r>
+              <a:rPr lang="fr-CA" dirty="0"/>
+              <a:t>no</a:t>
+            </a:r>
+          </a:p>
+        </p:txBody>
+      </p:sp>
+      <p:sp>
+        <p:nvSpPr>
+          <p:cNvPr id="9" name="Flèche : gauche 8">
+            <a:extLst>
+              <a:ext uri="{FF2B5EF4-FFF2-40B4-BE49-F238E27FC236}">
+                <a16:creationId xmlns:a16="http://schemas.microsoft.com/office/drawing/2014/main" id="{2F3C7780-FC5A-4E8D-8FF9-5DC91D364ED3}"/>
+              </a:ext>
+            </a:extLst>
+          </p:cNvPr>
+          <p:cNvSpPr/>
+          <p:nvPr>
+            <p:custDataLst>
+              <p:tags r:id="rId8"/>
+            </p:custDataLst>
+          </p:nvPr>
+        </p:nvSpPr>
+        <p:spPr>
+          <a:xfrm>
+            <a:off x="8132616" y="5454072"/>
+            <a:ext cx="3034148" cy="251876"/>
+          </a:xfrm>
+          <a:prstGeom prst="leftArrow">
+            <a:avLst/>
+          </a:prstGeom>
+        </p:spPr>
+        <p:style>
+          <a:lnRef idx="2">
+            <a:schemeClr val="accent2">
+              <a:shade val="50000"/>
+            </a:schemeClr>
+          </a:lnRef>
+          <a:fillRef idx="1">
+            <a:schemeClr val="accent2"/>
+          </a:fillRef>
+          <a:effectRef idx="0">
+            <a:schemeClr val="accent2"/>
+          </a:effectRef>
+          <a:fontRef idx="minor">
+            <a:schemeClr val="lt1"/>
+          </a:fontRef>
+        </p:style>
+        <p:txBody>
+          <a:bodyPr rtlCol="0" anchor="ctr"/>
+          <a:lstStyle/>
+          <a:p>
+            <a:pPr algn="ctr"/>
+            <a:r>
+              <a:rPr lang="fr-CA" dirty="0" err="1"/>
+              <a:t>AllowGroups</a:t>
+            </a:r>
+            <a:r>
+              <a:rPr lang="fr-CA" dirty="0"/>
+              <a:t> </a:t>
+            </a:r>
+            <a:r>
+              <a:rPr lang="fr-CA" dirty="0" err="1"/>
+              <a:t>ssh_group</a:t>
+            </a:r>
+            <a:endParaRPr lang="fr-CA" dirty="0"/>
+          </a:p>
+        </p:txBody>
+      </p:sp>
+    </p:spTree>
+    <p:extLst>
+      <p:ext uri="{BB962C8B-B14F-4D97-AF65-F5344CB8AC3E}">
+        <p14:creationId xmlns:p14="http://schemas.microsoft.com/office/powerpoint/2010/main" val="683642893"/>
       </p:ext>
     </p:extLst>
   </p:cSld>
@@ -11387,7 +13219,7 @@
             </a:r>
             <a:r>
               <a:rPr lang="fr-CA" sz="1400" dirty="0">
-                <a:hlinkClick r:id="rId5" tooltip="Site web"/>
+                <a:hlinkClick r:id="rId8" tooltip="Site web"/>
               </a:rPr>
               <a:t>site web</a:t>
             </a:r>
@@ -11397,7 +13229,7 @@
             </a:r>
             <a:r>
               <a:rPr lang="fr-CA" sz="1400" dirty="0">
-                <a:hlinkClick r:id="rId6" tooltip="Hébergeur web"/>
+                <a:hlinkClick r:id="rId9" tooltip="Hébergeur web"/>
               </a:rPr>
               <a:t>hébergé</a:t>
             </a:r>
@@ -11430,6 +13262,114 @@
               <a:rPr lang="fr-CA" sz="1400" dirty="0"/>
               <a:t> Desktop, etc.) ne font pas partie des services utilisés dans le cours.</a:t>
             </a:r>
+          </a:p>
+        </p:txBody>
+      </p:sp>
+      <p:sp>
+        <p:nvSpPr>
+          <p:cNvPr id="4" name="ZoneTexte 3">
+            <a:extLst>
+              <a:ext uri="{FF2B5EF4-FFF2-40B4-BE49-F238E27FC236}">
+                <a16:creationId xmlns:a16="http://schemas.microsoft.com/office/drawing/2014/main" id="{91245206-A260-4FEA-B579-F575B01A1E20}"/>
+              </a:ext>
+            </a:extLst>
+          </p:cNvPr>
+          <p:cNvSpPr txBox="1"/>
+          <p:nvPr>
+            <p:custDataLst>
+              <p:tags r:id="rId3"/>
+            </p:custDataLst>
+          </p:nvPr>
+        </p:nvSpPr>
+        <p:spPr>
+          <a:xfrm>
+            <a:off x="0" y="0"/>
+            <a:ext cx="3810000" cy="1270000"/>
+          </a:xfrm>
+          <a:prstGeom prst="rect">
+            <a:avLst/>
+          </a:prstGeom>
+          <a:noFill/>
+        </p:spPr>
+        <p:txBody>
+          <a:bodyPr vert="horz" rtlCol="0">
+            <a:spAutoFit/>
+          </a:bodyPr>
+          <a:lstStyle/>
+          <a:p>
+            <a:endParaRPr lang="fr-CA"/>
+          </a:p>
+        </p:txBody>
+      </p:sp>
+      <p:sp>
+        <p:nvSpPr>
+          <p:cNvPr id="5" name="ZoneTexte 4">
+            <a:extLst>
+              <a:ext uri="{FF2B5EF4-FFF2-40B4-BE49-F238E27FC236}">
+                <a16:creationId xmlns:a16="http://schemas.microsoft.com/office/drawing/2014/main" id="{44D8AA59-83BE-4737-A040-FA3763FF15AB}"/>
+              </a:ext>
+            </a:extLst>
+          </p:cNvPr>
+          <p:cNvSpPr txBox="1"/>
+          <p:nvPr>
+            <p:custDataLst>
+              <p:tags r:id="rId4"/>
+            </p:custDataLst>
+          </p:nvPr>
+        </p:nvSpPr>
+        <p:spPr>
+          <a:xfrm>
+            <a:off x="0" y="0"/>
+            <a:ext cx="3810000" cy="1270000"/>
+          </a:xfrm>
+          <a:prstGeom prst="rect">
+            <a:avLst/>
+          </a:prstGeom>
+          <a:noFill/>
+        </p:spPr>
+        <p:txBody>
+          <a:bodyPr vert="horz" rtlCol="0">
+            <a:spAutoFit/>
+          </a:bodyPr>
+          <a:lstStyle/>
+          <a:p>
+            <a:endParaRPr lang="fr-CA"/>
+          </a:p>
+        </p:txBody>
+      </p:sp>
+      <p:sp>
+        <p:nvSpPr>
+          <p:cNvPr id="6" name="ZoneTexte 5">
+            <a:extLst>
+              <a:ext uri="{FF2B5EF4-FFF2-40B4-BE49-F238E27FC236}">
+                <a16:creationId xmlns:a16="http://schemas.microsoft.com/office/drawing/2014/main" id="{8DBD436A-4430-4936-B03A-450AFD77AF58}"/>
+              </a:ext>
+            </a:extLst>
+          </p:cNvPr>
+          <p:cNvSpPr txBox="1"/>
+          <p:nvPr>
+            <p:custDataLst>
+              <p:tags r:id="rId5"/>
+            </p:custDataLst>
+          </p:nvPr>
+        </p:nvSpPr>
+        <p:spPr>
+          <a:xfrm>
+            <a:off x="0" y="0"/>
+            <a:ext cx="10769600" cy="1270000"/>
+          </a:xfrm>
+          <a:prstGeom prst="rect">
+            <a:avLst/>
+          </a:prstGeom>
+          <a:noFill/>
+        </p:spPr>
+        <p:txBody>
+          <a:bodyPr vert="horz" wrap="square" rtlCol="0">
+            <a:spAutoFit/>
+          </a:bodyPr>
+          <a:lstStyle/>
+          <a:p>
+            <a:endParaRPr lang="fr-CA"/>
           </a:p>
         </p:txBody>
       </p:sp>
@@ -12282,6 +14222,42 @@
           </a:p>
         </p:txBody>
       </p:sp>
+      <p:sp>
+        <p:nvSpPr>
+          <p:cNvPr id="4" name="ZoneTexte 3">
+            <a:extLst>
+              <a:ext uri="{FF2B5EF4-FFF2-40B4-BE49-F238E27FC236}">
+                <a16:creationId xmlns:a16="http://schemas.microsoft.com/office/drawing/2014/main" id="{C78D66F1-1235-490E-9B44-371DD3838E15}"/>
+              </a:ext>
+            </a:extLst>
+          </p:cNvPr>
+          <p:cNvSpPr txBox="1"/>
+          <p:nvPr>
+            <p:custDataLst>
+              <p:tags r:id="rId4"/>
+            </p:custDataLst>
+          </p:nvPr>
+        </p:nvSpPr>
+        <p:spPr>
+          <a:xfrm>
+            <a:off x="0" y="0"/>
+            <a:ext cx="3810000" cy="1270000"/>
+          </a:xfrm>
+          <a:prstGeom prst="rect">
+            <a:avLst/>
+          </a:prstGeom>
+          <a:noFill/>
+        </p:spPr>
+        <p:txBody>
+          <a:bodyPr vert="horz" rtlCol="0">
+            <a:spAutoFit/>
+          </a:bodyPr>
+          <a:lstStyle/>
+          <a:p>
+            <a:endParaRPr lang="fr-CA"/>
+          </a:p>
+        </p:txBody>
+      </p:sp>
     </p:spTree>
     <p:extLst>
       <p:ext uri="{BB962C8B-B14F-4D97-AF65-F5344CB8AC3E}">
@@ -12997,7 +14973,19 @@
           <a:p>
             <a:r>
               <a:rPr lang="fr-CA" dirty="0"/>
-              <a:t>Si vous êtes connecté à un système Linux distant via SSH, il vous suffit d'utiliser la commande exit pour vous déconnecter de SSH.</a:t>
+              <a:t>Si vous êtes connecté à un système Linux distant via SSH, il vous suffit d'utiliser la commande </a:t>
+            </a:r>
+            <a:r>
+              <a:rPr lang="fr-CA" b="1" dirty="0">
+                <a:solidFill>
+                  <a:srgbClr val="FF9B45"/>
+                </a:solidFill>
+              </a:rPr>
+              <a:t>exit</a:t>
+            </a:r>
+            <a:r>
+              <a:rPr lang="fr-CA" dirty="0"/>
+              <a:t> pour vous déconnecter de SSH.</a:t>
             </a:r>
           </a:p>
         </p:txBody>
@@ -13037,7 +15025,7 @@
           <p:cNvPr id="2" name="Titre 1">
             <a:extLst>
               <a:ext uri="{FF2B5EF4-FFF2-40B4-BE49-F238E27FC236}">
-                <a16:creationId xmlns:a16="http://schemas.microsoft.com/office/drawing/2014/main" id="{806E0CFB-F911-4613-8855-9328237D2EE6}"/>
+                <a16:creationId xmlns:a16="http://schemas.microsoft.com/office/drawing/2014/main" id="{447AC09D-E228-418C-8FE1-DF936ABBA677}"/>
               </a:ext>
             </a:extLst>
           </p:cNvPr>
@@ -13051,12 +15039,7 @@
             </p:custDataLst>
           </p:nvPr>
         </p:nvSpPr>
-        <p:spPr>
-          <a:xfrm>
-            <a:off x="521208" y="1536192"/>
-            <a:ext cx="3640245" cy="640080"/>
-          </a:xfrm>
-        </p:spPr>
+        <p:spPr/>
         <p:txBody>
           <a:bodyPr>
             <a:normAutofit fontScale="90000"/>
@@ -13065,53 +15048,77 @@
           <a:p>
             <a:r>
               <a:rPr lang="fr-CA" dirty="0"/>
-              <a:t>Exemple de clé non reconnu :</a:t>
+              <a:t>Fichier de configuration des machines</a:t>
             </a:r>
           </a:p>
         </p:txBody>
       </p:sp>
-      <p:pic>
-        <p:nvPicPr>
-          <p:cNvPr id="5" name="Espace réservé du contenu 4" descr="Une image contenant texte&#10;&#10;Description générée automatiquement">
+      <p:sp>
+        <p:nvSpPr>
+          <p:cNvPr id="3" name="Espace réservé du contenu 2">
             <a:extLst>
               <a:ext uri="{FF2B5EF4-FFF2-40B4-BE49-F238E27FC236}">
-                <a16:creationId xmlns:a16="http://schemas.microsoft.com/office/drawing/2014/main" id="{CC7FEB24-7592-4A94-96FE-2E44FF64ABE1}"/>
+                <a16:creationId xmlns:a16="http://schemas.microsoft.com/office/drawing/2014/main" id="{BA6DFDE9-EB22-42ED-BC2F-5E441B20CA66}"/>
               </a:ext>
             </a:extLst>
           </p:cNvPr>
-          <p:cNvPicPr>
-            <a:picLocks noGrp="1" noChangeAspect="1"/>
-          </p:cNvPicPr>
+          <p:cNvSpPr>
+            <a:spLocks noGrp="1"/>
+          </p:cNvSpPr>
           <p:nvPr>
             <p:ph sz="quarter" idx="13"/>
             <p:custDataLst>
               <p:tags r:id="rId2"/>
             </p:custDataLst>
           </p:nvPr>
+        </p:nvSpPr>
+        <p:spPr/>
+        <p:txBody>
+          <a:bodyPr/>
+          <a:lstStyle/>
+          <a:p>
+            <a:endParaRPr lang="fr-CA" dirty="0"/>
+          </a:p>
+        </p:txBody>
+      </p:sp>
+      <p:pic>
+        <p:nvPicPr>
+          <p:cNvPr id="4" name="Image 3">
+            <a:extLst>
+              <a:ext uri="{FF2B5EF4-FFF2-40B4-BE49-F238E27FC236}">
+                <a16:creationId xmlns:a16="http://schemas.microsoft.com/office/drawing/2014/main" id="{FDE59116-3120-4407-9DDE-332D35FA354F}"/>
+              </a:ext>
+            </a:extLst>
+          </p:cNvPr>
+          <p:cNvPicPr>
+            <a:picLocks noChangeAspect="1"/>
+          </p:cNvPicPr>
+          <p:nvPr>
+            <p:custDataLst>
+              <p:tags r:id="rId3"/>
+            </p:custDataLst>
+          </p:nvPr>
         </p:nvPicPr>
         <p:blipFill>
-          <a:blip r:embed="rId4">
-            <a:extLst>
-              <a:ext uri="{28A0092B-C50C-407E-A947-70E740481C1C}">
-                <a14:useLocalDpi xmlns:a14="http://schemas.microsoft.com/office/drawing/2010/main" val="0"/>
-              </a:ext>
-            </a:extLst>
-          </a:blip>
+          <a:blip r:embed="rId5"/>
           <a:stretch>
             <a:fillRect/>
           </a:stretch>
         </p:blipFill>
         <p:spPr>
           <a:xfrm>
-            <a:off x="4721290" y="311960"/>
-            <a:ext cx="7244222" cy="6306459"/>
+            <a:off x="2985286" y="2529558"/>
+            <a:ext cx="5059587" cy="3182886"/>
           </a:xfrm>
+          <a:prstGeom prst="rect">
+            <a:avLst/>
+          </a:prstGeom>
         </p:spPr>
       </p:pic>
     </p:spTree>
     <p:extLst>
       <p:ext uri="{BB962C8B-B14F-4D97-AF65-F5344CB8AC3E}">
-        <p14:creationId xmlns:p14="http://schemas.microsoft.com/office/powerpoint/2010/main" val="3228696591"/>
+        <p14:creationId xmlns:p14="http://schemas.microsoft.com/office/powerpoint/2010/main" val="1523883165"/>
       </p:ext>
     </p:extLst>
   </p:cSld>
@@ -13129,61 +15136,61 @@
 
 <file path=ppt/tags/tag10.xml><?xml version="1.0" encoding="utf-8"?>
 <p:tagLst xmlns:a="http://schemas.openxmlformats.org/drawingml/2006/main" xmlns:r="http://schemas.openxmlformats.org/officeDocument/2006/relationships" xmlns:p="http://schemas.openxmlformats.org/presentationml/2006/main">
-  <p:tag name="NUM" val="1"/>
+  <p:tag name="NUM" val="4"/>
 </p:tagLst>
 </file>
 
 <file path=ppt/tags/tag11.xml><?xml version="1.0" encoding="utf-8"?>
 <p:tagLst xmlns:a="http://schemas.openxmlformats.org/drawingml/2006/main" xmlns:r="http://schemas.openxmlformats.org/officeDocument/2006/relationships" xmlns:p="http://schemas.openxmlformats.org/presentationml/2006/main">
-  <p:tag name="NUM" val="2"/>
+  <p:tag name="NUM" val="5"/>
 </p:tagLst>
 </file>
 
 <file path=ppt/tags/tag12.xml><?xml version="1.0" encoding="utf-8"?>
 <p:tagLst xmlns:a="http://schemas.openxmlformats.org/drawingml/2006/main" xmlns:r="http://schemas.openxmlformats.org/officeDocument/2006/relationships" xmlns:p="http://schemas.openxmlformats.org/presentationml/2006/main">
-  <p:tag name="NUM" val="3"/>
+  <p:tag name="NUM" val="1"/>
 </p:tagLst>
 </file>
 
 <file path=ppt/tags/tag13.xml><?xml version="1.0" encoding="utf-8"?>
 <p:tagLst xmlns:a="http://schemas.openxmlformats.org/drawingml/2006/main" xmlns:r="http://schemas.openxmlformats.org/officeDocument/2006/relationships" xmlns:p="http://schemas.openxmlformats.org/presentationml/2006/main">
-  <p:tag name="NUM" val="1"/>
+  <p:tag name="NUM" val="2"/>
 </p:tagLst>
 </file>
 
 <file path=ppt/tags/tag14.xml><?xml version="1.0" encoding="utf-8"?>
 <p:tagLst xmlns:a="http://schemas.openxmlformats.org/drawingml/2006/main" xmlns:r="http://schemas.openxmlformats.org/officeDocument/2006/relationships" xmlns:p="http://schemas.openxmlformats.org/presentationml/2006/main">
-  <p:tag name="NUM" val="2"/>
+  <p:tag name="NUM" val="1"/>
 </p:tagLst>
 </file>
 
 <file path=ppt/tags/tag15.xml><?xml version="1.0" encoding="utf-8"?>
 <p:tagLst xmlns:a="http://schemas.openxmlformats.org/drawingml/2006/main" xmlns:r="http://schemas.openxmlformats.org/officeDocument/2006/relationships" xmlns:p="http://schemas.openxmlformats.org/presentationml/2006/main">
-  <p:tag name="NUM" val="3"/>
+  <p:tag name="NUM" val="2"/>
 </p:tagLst>
 </file>
 
 <file path=ppt/tags/tag16.xml><?xml version="1.0" encoding="utf-8"?>
 <p:tagLst xmlns:a="http://schemas.openxmlformats.org/drawingml/2006/main" xmlns:r="http://schemas.openxmlformats.org/officeDocument/2006/relationships" xmlns:p="http://schemas.openxmlformats.org/presentationml/2006/main">
-  <p:tag name="NUM" val="4"/>
+  <p:tag name="NUM" val="1"/>
 </p:tagLst>
 </file>
 
 <file path=ppt/tags/tag17.xml><?xml version="1.0" encoding="utf-8"?>
 <p:tagLst xmlns:a="http://schemas.openxmlformats.org/drawingml/2006/main" xmlns:r="http://schemas.openxmlformats.org/officeDocument/2006/relationships" xmlns:p="http://schemas.openxmlformats.org/presentationml/2006/main">
-  <p:tag name="NUM" val="1"/>
+  <p:tag name="NUM" val="2"/>
 </p:tagLst>
 </file>
 
 <file path=ppt/tags/tag18.xml><?xml version="1.0" encoding="utf-8"?>
 <p:tagLst xmlns:a="http://schemas.openxmlformats.org/drawingml/2006/main" xmlns:r="http://schemas.openxmlformats.org/officeDocument/2006/relationships" xmlns:p="http://schemas.openxmlformats.org/presentationml/2006/main">
-  <p:tag name="NUM" val="2"/>
+  <p:tag name="NUM" val="3"/>
 </p:tagLst>
 </file>
 
 <file path=ppt/tags/tag19.xml><?xml version="1.0" encoding="utf-8"?>
 <p:tagLst xmlns:a="http://schemas.openxmlformats.org/drawingml/2006/main" xmlns:r="http://schemas.openxmlformats.org/officeDocument/2006/relationships" xmlns:p="http://schemas.openxmlformats.org/presentationml/2006/main">
-  <p:tag name="NUM" val="3"/>
+  <p:tag name="NUM" val="4"/>
 </p:tagLst>
 </file>
 
@@ -13207,13 +15214,49 @@
 
 <file path=ppt/tags/tag22.xml><?xml version="1.0" encoding="utf-8"?>
 <p:tagLst xmlns:a="http://schemas.openxmlformats.org/drawingml/2006/main" xmlns:r="http://schemas.openxmlformats.org/officeDocument/2006/relationships" xmlns:p="http://schemas.openxmlformats.org/presentationml/2006/main">
-  <p:tag name="NUM" val="1"/>
+  <p:tag name="NUM" val="3"/>
 </p:tagLst>
 </file>
 
 <file path=ppt/tags/tag23.xml><?xml version="1.0" encoding="utf-8"?>
 <p:tagLst xmlns:a="http://schemas.openxmlformats.org/drawingml/2006/main" xmlns:r="http://schemas.openxmlformats.org/officeDocument/2006/relationships" xmlns:p="http://schemas.openxmlformats.org/presentationml/2006/main">
+  <p:tag name="NUM" val="4"/>
+</p:tagLst>
+</file>
+
+<file path=ppt/tags/tag24.xml><?xml version="1.0" encoding="utf-8"?>
+<p:tagLst xmlns:a="http://schemas.openxmlformats.org/drawingml/2006/main" xmlns:r="http://schemas.openxmlformats.org/officeDocument/2006/relationships" xmlns:p="http://schemas.openxmlformats.org/presentationml/2006/main">
+  <p:tag name="NUM" val="1"/>
+</p:tagLst>
+</file>
+
+<file path=ppt/tags/tag25.xml><?xml version="1.0" encoding="utf-8"?>
+<p:tagLst xmlns:a="http://schemas.openxmlformats.org/drawingml/2006/main" xmlns:r="http://schemas.openxmlformats.org/officeDocument/2006/relationships" xmlns:p="http://schemas.openxmlformats.org/presentationml/2006/main">
   <p:tag name="NUM" val="2"/>
+</p:tagLst>
+</file>
+
+<file path=ppt/tags/tag26.xml><?xml version="1.0" encoding="utf-8"?>
+<p:tagLst xmlns:a="http://schemas.openxmlformats.org/drawingml/2006/main" xmlns:r="http://schemas.openxmlformats.org/officeDocument/2006/relationships" xmlns:p="http://schemas.openxmlformats.org/presentationml/2006/main">
+  <p:tag name="NUM" val="3"/>
+</p:tagLst>
+</file>
+
+<file path=ppt/tags/tag27.xml><?xml version="1.0" encoding="utf-8"?>
+<p:tagLst xmlns:a="http://schemas.openxmlformats.org/drawingml/2006/main" xmlns:r="http://schemas.openxmlformats.org/officeDocument/2006/relationships" xmlns:p="http://schemas.openxmlformats.org/presentationml/2006/main">
+  <p:tag name="NUM" val="1"/>
+</p:tagLst>
+</file>
+
+<file path=ppt/tags/tag28.xml><?xml version="1.0" encoding="utf-8"?>
+<p:tagLst xmlns:a="http://schemas.openxmlformats.org/drawingml/2006/main" xmlns:r="http://schemas.openxmlformats.org/officeDocument/2006/relationships" xmlns:p="http://schemas.openxmlformats.org/presentationml/2006/main">
+  <p:tag name="NUM" val="2"/>
+</p:tagLst>
+</file>
+
+<file path=ppt/tags/tag29.xml><?xml version="1.0" encoding="utf-8"?>
+<p:tagLst xmlns:a="http://schemas.openxmlformats.org/drawingml/2006/main" xmlns:r="http://schemas.openxmlformats.org/officeDocument/2006/relationships" xmlns:p="http://schemas.openxmlformats.org/presentationml/2006/main">
+  <p:tag name="NUM" val="1"/>
 </p:tagLst>
 </file>
 
@@ -13223,39 +15266,207 @@
 </p:tagLst>
 </file>
 
-<file path=ppt/tags/tag4.xml><?xml version="1.0" encoding="utf-8"?>
+<file path=ppt/tags/tag30.xml><?xml version="1.0" encoding="utf-8"?>
+<p:tagLst xmlns:a="http://schemas.openxmlformats.org/drawingml/2006/main" xmlns:r="http://schemas.openxmlformats.org/officeDocument/2006/relationships" xmlns:p="http://schemas.openxmlformats.org/presentationml/2006/main">
+  <p:tag name="NUM" val="2"/>
+</p:tagLst>
+</file>
+
+<file path=ppt/tags/tag31.xml><?xml version="1.0" encoding="utf-8"?>
+<p:tagLst xmlns:a="http://schemas.openxmlformats.org/drawingml/2006/main" xmlns:r="http://schemas.openxmlformats.org/officeDocument/2006/relationships" xmlns:p="http://schemas.openxmlformats.org/presentationml/2006/main">
+  <p:tag name="NUM" val="3"/>
+</p:tagLst>
+</file>
+
+<file path=ppt/tags/tag32.xml><?xml version="1.0" encoding="utf-8"?>
 <p:tagLst xmlns:a="http://schemas.openxmlformats.org/drawingml/2006/main" xmlns:r="http://schemas.openxmlformats.org/officeDocument/2006/relationships" xmlns:p="http://schemas.openxmlformats.org/presentationml/2006/main">
   <p:tag name="NUM" val="1"/>
 </p:tagLst>
 </file>
 
-<file path=ppt/tags/tag5.xml><?xml version="1.0" encoding="utf-8"?>
+<file path=ppt/tags/tag33.xml><?xml version="1.0" encoding="utf-8"?>
 <p:tagLst xmlns:a="http://schemas.openxmlformats.org/drawingml/2006/main" xmlns:r="http://schemas.openxmlformats.org/officeDocument/2006/relationships" xmlns:p="http://schemas.openxmlformats.org/presentationml/2006/main">
   <p:tag name="NUM" val="2"/>
 </p:tagLst>
 </file>
 
-<file path=ppt/tags/tag6.xml><?xml version="1.0" encoding="utf-8"?>
+<file path=ppt/tags/tag34.xml><?xml version="1.0" encoding="utf-8"?>
+<p:tagLst xmlns:a="http://schemas.openxmlformats.org/drawingml/2006/main" xmlns:r="http://schemas.openxmlformats.org/officeDocument/2006/relationships" xmlns:p="http://schemas.openxmlformats.org/presentationml/2006/main">
+  <p:tag name="NUM" val="3"/>
+</p:tagLst>
+</file>
+
+<file path=ppt/tags/tag35.xml><?xml version="1.0" encoding="utf-8"?>
 <p:tagLst xmlns:a="http://schemas.openxmlformats.org/drawingml/2006/main" xmlns:r="http://schemas.openxmlformats.org/officeDocument/2006/relationships" xmlns:p="http://schemas.openxmlformats.org/presentationml/2006/main">
   <p:tag name="NUM" val="1"/>
 </p:tagLst>
 </file>
 
-<file path=ppt/tags/tag7.xml><?xml version="1.0" encoding="utf-8"?>
+<file path=ppt/tags/tag36.xml><?xml version="1.0" encoding="utf-8"?>
 <p:tagLst xmlns:a="http://schemas.openxmlformats.org/drawingml/2006/main" xmlns:r="http://schemas.openxmlformats.org/officeDocument/2006/relationships" xmlns:p="http://schemas.openxmlformats.org/presentationml/2006/main">
   <p:tag name="NUM" val="2"/>
 </p:tagLst>
 </file>
 
-<file path=ppt/tags/tag8.xml><?xml version="1.0" encoding="utf-8"?>
+<file path=ppt/tags/tag37.xml><?xml version="1.0" encoding="utf-8"?>
+<p:tagLst xmlns:a="http://schemas.openxmlformats.org/drawingml/2006/main" xmlns:r="http://schemas.openxmlformats.org/officeDocument/2006/relationships" xmlns:p="http://schemas.openxmlformats.org/presentationml/2006/main">
+  <p:tag name="NUM" val="3"/>
+</p:tagLst>
+</file>
+
+<file path=ppt/tags/tag38.xml><?xml version="1.0" encoding="utf-8"?>
 <p:tagLst xmlns:a="http://schemas.openxmlformats.org/drawingml/2006/main" xmlns:r="http://schemas.openxmlformats.org/officeDocument/2006/relationships" xmlns:p="http://schemas.openxmlformats.org/presentationml/2006/main">
   <p:tag name="NUM" val="1"/>
 </p:tagLst>
 </file>
 
+<file path=ppt/tags/tag39.xml><?xml version="1.0" encoding="utf-8"?>
+<p:tagLst xmlns:a="http://schemas.openxmlformats.org/drawingml/2006/main" xmlns:r="http://schemas.openxmlformats.org/officeDocument/2006/relationships" xmlns:p="http://schemas.openxmlformats.org/presentationml/2006/main">
+  <p:tag name="NUM" val="2"/>
+</p:tagLst>
+</file>
+
+<file path=ppt/tags/tag4.xml><?xml version="1.0" encoding="utf-8"?>
+<p:tagLst xmlns:a="http://schemas.openxmlformats.org/drawingml/2006/main" xmlns:r="http://schemas.openxmlformats.org/officeDocument/2006/relationships" xmlns:p="http://schemas.openxmlformats.org/presentationml/2006/main">
+  <p:tag name="NUM" val="4"/>
+</p:tagLst>
+</file>
+
+<file path=ppt/tags/tag40.xml><?xml version="1.0" encoding="utf-8"?>
+<p:tagLst xmlns:a="http://schemas.openxmlformats.org/drawingml/2006/main" xmlns:r="http://schemas.openxmlformats.org/officeDocument/2006/relationships" xmlns:p="http://schemas.openxmlformats.org/presentationml/2006/main">
+  <p:tag name="NUM" val="3"/>
+</p:tagLst>
+</file>
+
+<file path=ppt/tags/tag41.xml><?xml version="1.0" encoding="utf-8"?>
+<p:tagLst xmlns:a="http://schemas.openxmlformats.org/drawingml/2006/main" xmlns:r="http://schemas.openxmlformats.org/officeDocument/2006/relationships" xmlns:p="http://schemas.openxmlformats.org/presentationml/2006/main">
+  <p:tag name="NUM" val="1"/>
+</p:tagLst>
+</file>
+
+<file path=ppt/tags/tag42.xml><?xml version="1.0" encoding="utf-8"?>
+<p:tagLst xmlns:a="http://schemas.openxmlformats.org/drawingml/2006/main" xmlns:r="http://schemas.openxmlformats.org/officeDocument/2006/relationships" xmlns:p="http://schemas.openxmlformats.org/presentationml/2006/main">
+  <p:tag name="NUM" val="2"/>
+</p:tagLst>
+</file>
+
+<file path=ppt/tags/tag43.xml><?xml version="1.0" encoding="utf-8"?>
+<p:tagLst xmlns:a="http://schemas.openxmlformats.org/drawingml/2006/main" xmlns:r="http://schemas.openxmlformats.org/officeDocument/2006/relationships" xmlns:p="http://schemas.openxmlformats.org/presentationml/2006/main">
+  <p:tag name="NUM" val="3"/>
+</p:tagLst>
+</file>
+
+<file path=ppt/tags/tag44.xml><?xml version="1.0" encoding="utf-8"?>
+<p:tagLst xmlns:a="http://schemas.openxmlformats.org/drawingml/2006/main" xmlns:r="http://schemas.openxmlformats.org/officeDocument/2006/relationships" xmlns:p="http://schemas.openxmlformats.org/presentationml/2006/main">
+  <p:tag name="NUM" val="1"/>
+</p:tagLst>
+</file>
+
+<file path=ppt/tags/tag45.xml><?xml version="1.0" encoding="utf-8"?>
+<p:tagLst xmlns:a="http://schemas.openxmlformats.org/drawingml/2006/main" xmlns:r="http://schemas.openxmlformats.org/officeDocument/2006/relationships" xmlns:p="http://schemas.openxmlformats.org/presentationml/2006/main">
+  <p:tag name="NUM" val="2"/>
+</p:tagLst>
+</file>
+
+<file path=ppt/tags/tag46.xml><?xml version="1.0" encoding="utf-8"?>
+<p:tagLst xmlns:a="http://schemas.openxmlformats.org/drawingml/2006/main" xmlns:r="http://schemas.openxmlformats.org/officeDocument/2006/relationships" xmlns:p="http://schemas.openxmlformats.org/presentationml/2006/main">
+  <p:tag name="NUM" val="3"/>
+</p:tagLst>
+</file>
+
+<file path=ppt/tags/tag47.xml><?xml version="1.0" encoding="utf-8"?>
+<p:tagLst xmlns:a="http://schemas.openxmlformats.org/drawingml/2006/main" xmlns:r="http://schemas.openxmlformats.org/officeDocument/2006/relationships" xmlns:p="http://schemas.openxmlformats.org/presentationml/2006/main">
+  <p:tag name="NUM" val="4"/>
+</p:tagLst>
+</file>
+
+<file path=ppt/tags/tag48.xml><?xml version="1.0" encoding="utf-8"?>
+<p:tagLst xmlns:a="http://schemas.openxmlformats.org/drawingml/2006/main" xmlns:r="http://schemas.openxmlformats.org/officeDocument/2006/relationships" xmlns:p="http://schemas.openxmlformats.org/presentationml/2006/main">
+  <p:tag name="NUM" val="5"/>
+</p:tagLst>
+</file>
+
+<file path=ppt/tags/tag49.xml><?xml version="1.0" encoding="utf-8"?>
+<p:tagLst xmlns:a="http://schemas.openxmlformats.org/drawingml/2006/main" xmlns:r="http://schemas.openxmlformats.org/officeDocument/2006/relationships" xmlns:p="http://schemas.openxmlformats.org/presentationml/2006/main">
+  <p:tag name="NUM" val="6"/>
+</p:tagLst>
+</file>
+
+<file path=ppt/tags/tag5.xml><?xml version="1.0" encoding="utf-8"?>
+<p:tagLst xmlns:a="http://schemas.openxmlformats.org/drawingml/2006/main" xmlns:r="http://schemas.openxmlformats.org/officeDocument/2006/relationships" xmlns:p="http://schemas.openxmlformats.org/presentationml/2006/main">
+  <p:tag name="NUM" val="5"/>
+</p:tagLst>
+</file>
+
+<file path=ppt/tags/tag50.xml><?xml version="1.0" encoding="utf-8"?>
+<p:tagLst xmlns:a="http://schemas.openxmlformats.org/drawingml/2006/main" xmlns:r="http://schemas.openxmlformats.org/officeDocument/2006/relationships" xmlns:p="http://schemas.openxmlformats.org/presentationml/2006/main">
+  <p:tag name="NUM" val="1"/>
+</p:tagLst>
+</file>
+
+<file path=ppt/tags/tag51.xml><?xml version="1.0" encoding="utf-8"?>
+<p:tagLst xmlns:a="http://schemas.openxmlformats.org/drawingml/2006/main" xmlns:r="http://schemas.openxmlformats.org/officeDocument/2006/relationships" xmlns:p="http://schemas.openxmlformats.org/presentationml/2006/main">
+  <p:tag name="NUM" val="2"/>
+</p:tagLst>
+</file>
+
+<file path=ppt/tags/tag52.xml><?xml version="1.0" encoding="utf-8"?>
+<p:tagLst xmlns:a="http://schemas.openxmlformats.org/drawingml/2006/main" xmlns:r="http://schemas.openxmlformats.org/officeDocument/2006/relationships" xmlns:p="http://schemas.openxmlformats.org/presentationml/2006/main">
+  <p:tag name="NUM" val="3"/>
+</p:tagLst>
+</file>
+
+<file path=ppt/tags/tag53.xml><?xml version="1.0" encoding="utf-8"?>
+<p:tagLst xmlns:a="http://schemas.openxmlformats.org/drawingml/2006/main" xmlns:r="http://schemas.openxmlformats.org/officeDocument/2006/relationships" xmlns:p="http://schemas.openxmlformats.org/presentationml/2006/main">
+  <p:tag name="NUM" val="4"/>
+</p:tagLst>
+</file>
+
+<file path=ppt/tags/tag54.xml><?xml version="1.0" encoding="utf-8"?>
+<p:tagLst xmlns:a="http://schemas.openxmlformats.org/drawingml/2006/main" xmlns:r="http://schemas.openxmlformats.org/officeDocument/2006/relationships" xmlns:p="http://schemas.openxmlformats.org/presentationml/2006/main">
+  <p:tag name="NUM" val="5"/>
+</p:tagLst>
+</file>
+
+<file path=ppt/tags/tag55.xml><?xml version="1.0" encoding="utf-8"?>
+<p:tagLst xmlns:a="http://schemas.openxmlformats.org/drawingml/2006/main" xmlns:r="http://schemas.openxmlformats.org/officeDocument/2006/relationships" xmlns:p="http://schemas.openxmlformats.org/presentationml/2006/main">
+  <p:tag name="NUM" val="6"/>
+</p:tagLst>
+</file>
+
+<file path=ppt/tags/tag56.xml><?xml version="1.0" encoding="utf-8"?>
+<p:tagLst xmlns:a="http://schemas.openxmlformats.org/drawingml/2006/main" xmlns:r="http://schemas.openxmlformats.org/officeDocument/2006/relationships" xmlns:p="http://schemas.openxmlformats.org/presentationml/2006/main">
+  <p:tag name="NUM" val="7"/>
+</p:tagLst>
+</file>
+
+<file path=ppt/tags/tag57.xml><?xml version="1.0" encoding="utf-8"?>
+<p:tagLst xmlns:a="http://schemas.openxmlformats.org/drawingml/2006/main" xmlns:r="http://schemas.openxmlformats.org/officeDocument/2006/relationships" xmlns:p="http://schemas.openxmlformats.org/presentationml/2006/main">
+  <p:tag name="NUM" val="8"/>
+</p:tagLst>
+</file>
+
+<file path=ppt/tags/tag6.xml><?xml version="1.0" encoding="utf-8"?>
+<p:tagLst xmlns:a="http://schemas.openxmlformats.org/drawingml/2006/main" xmlns:r="http://schemas.openxmlformats.org/officeDocument/2006/relationships" xmlns:p="http://schemas.openxmlformats.org/presentationml/2006/main">
+  <p:tag name="NUM" val="6"/>
+</p:tagLst>
+</file>
+
+<file path=ppt/tags/tag7.xml><?xml version="1.0" encoding="utf-8"?>
+<p:tagLst xmlns:a="http://schemas.openxmlformats.org/drawingml/2006/main" xmlns:r="http://schemas.openxmlformats.org/officeDocument/2006/relationships" xmlns:p="http://schemas.openxmlformats.org/presentationml/2006/main">
+  <p:tag name="NUM" val="1"/>
+</p:tagLst>
+</file>
+
+<file path=ppt/tags/tag8.xml><?xml version="1.0" encoding="utf-8"?>
+<p:tagLst xmlns:a="http://schemas.openxmlformats.org/drawingml/2006/main" xmlns:r="http://schemas.openxmlformats.org/officeDocument/2006/relationships" xmlns:p="http://schemas.openxmlformats.org/presentationml/2006/main">
+  <p:tag name="NUM" val="2"/>
+</p:tagLst>
+</file>
+
 <file path=ppt/tags/tag9.xml><?xml version="1.0" encoding="utf-8"?>
 <p:tagLst xmlns:a="http://schemas.openxmlformats.org/drawingml/2006/main" xmlns:r="http://schemas.openxmlformats.org/officeDocument/2006/relationships" xmlns:p="http://schemas.openxmlformats.org/presentationml/2006/main">
-  <p:tag name="NUM" val="2"/>
+  <p:tag name="NUM" val="3"/>
 </p:tagLst>
 </file>
 
@@ -14017,9 +16228,12 @@
 </file>
 
 <file path=customXml/item1.xml><?xml version="1.0" encoding="utf-8"?>
-<p:properties xmlns:p="http://schemas.microsoft.com/office/2006/metadata/properties" xmlns:xsi="http://www.w3.org/2001/XMLSchema-instance" xmlns:pc="http://schemas.microsoft.com/office/infopath/2007/PartnerControls">
-  <documentManagement/>
-</p:properties>
+<?mso-contentType ?>
+<FormTemplates xmlns="http://schemas.microsoft.com/sharepoint/v3/contenttype/forms">
+  <Display>DocumentLibraryForm</Display>
+  <Edit>DocumentLibraryForm</Edit>
+  <New>DocumentLibraryForm</New>
+</FormTemplates>
 </file>
 
 <file path=customXml/item2.xml><?xml version="1.0" encoding="utf-8"?>
@@ -14232,27 +16446,15 @@
 </file>
 
 <file path=customXml/item3.xml><?xml version="1.0" encoding="utf-8"?>
-<?mso-contentType ?>
-<FormTemplates xmlns="http://schemas.microsoft.com/sharepoint/v3/contenttype/forms">
-  <Display>DocumentLibraryForm</Display>
-  <Edit>DocumentLibraryForm</Edit>
-  <New>DocumentLibraryForm</New>
-</FormTemplates>
+<p:properties xmlns:p="http://schemas.microsoft.com/office/2006/metadata/properties" xmlns:xsi="http://www.w3.org/2001/XMLSchema-instance" xmlns:pc="http://schemas.microsoft.com/office/infopath/2007/PartnerControls">
+  <documentManagement/>
+</p:properties>
 </file>
 
 <file path=customXml/itemProps1.xml><?xml version="1.0" encoding="utf-8"?>
-<ds:datastoreItem xmlns:ds="http://schemas.openxmlformats.org/officeDocument/2006/customXml" ds:itemID="{9B780DE2-F02B-441B-A6E9-690F74AB081C}">
+<ds:datastoreItem xmlns:ds="http://schemas.openxmlformats.org/officeDocument/2006/customXml" ds:itemID="{30F2025D-B737-41D8-9334-EE8F2C238280}">
   <ds:schemaRefs>
-    <ds:schemaRef ds:uri="http://purl.org/dc/terms/"/>
-    <ds:schemaRef ds:uri="http://schemas.microsoft.com/office/2006/documentManagement/types"/>
-    <ds:schemaRef ds:uri="http://www.w3.org/XML/1998/namespace"/>
-    <ds:schemaRef ds:uri="http://schemas.microsoft.com/office/infopath/2007/PartnerControls"/>
-    <ds:schemaRef ds:uri="bf44742c-fc46-4616-8725-dff710699ae5"/>
-    <ds:schemaRef ds:uri="http://purl.org/dc/dcmitype/"/>
-    <ds:schemaRef ds:uri="http://purl.org/dc/elements/1.1/"/>
-    <ds:schemaRef ds:uri="http://schemas.openxmlformats.org/package/2006/metadata/core-properties"/>
-    <ds:schemaRef ds:uri="634a623b-b5c2-41f0-818c-5d787e90d776"/>
-    <ds:schemaRef ds:uri="http://schemas.microsoft.com/office/2006/metadata/properties"/>
+    <ds:schemaRef ds:uri="http://schemas.microsoft.com/sharepoint/v3/contenttype/forms"/>
   </ds:schemaRefs>
 </ds:datastoreItem>
 </file>
@@ -14277,9 +16479,18 @@
 </file>
 
 <file path=customXml/itemProps3.xml><?xml version="1.0" encoding="utf-8"?>
-<ds:datastoreItem xmlns:ds="http://schemas.openxmlformats.org/officeDocument/2006/customXml" ds:itemID="{30F2025D-B737-41D8-9334-EE8F2C238280}">
+<ds:datastoreItem xmlns:ds="http://schemas.openxmlformats.org/officeDocument/2006/customXml" ds:itemID="{9B780DE2-F02B-441B-A6E9-690F74AB081C}">
   <ds:schemaRefs>
-    <ds:schemaRef ds:uri="http://schemas.microsoft.com/sharepoint/v3/contenttype/forms"/>
+    <ds:schemaRef ds:uri="http://purl.org/dc/terms/"/>
+    <ds:schemaRef ds:uri="http://schemas.microsoft.com/office/2006/documentManagement/types"/>
+    <ds:schemaRef ds:uri="http://www.w3.org/XML/1998/namespace"/>
+    <ds:schemaRef ds:uri="http://schemas.microsoft.com/office/infopath/2007/PartnerControls"/>
+    <ds:schemaRef ds:uri="bf44742c-fc46-4616-8725-dff710699ae5"/>
+    <ds:schemaRef ds:uri="http://purl.org/dc/dcmitype/"/>
+    <ds:schemaRef ds:uri="http://purl.org/dc/elements/1.1/"/>
+    <ds:schemaRef ds:uri="http://schemas.openxmlformats.org/package/2006/metadata/core-properties"/>
+    <ds:schemaRef ds:uri="634a623b-b5c2-41f0-818c-5d787e90d776"/>
+    <ds:schemaRef ds:uri="http://schemas.microsoft.com/office/2006/metadata/properties"/>
   </ds:schemaRefs>
 </ds:datastoreItem>
 </file>
</xml_diff>